<commit_message>
Tratando arquivos CSS como módulos
</commit_message>
<xml_diff>
--- a/docs/Webpack-resumo.pptx
+++ b/docs/Webpack-resumo.pptx
@@ -10,9 +10,9 @@
     <p:sldId id="265" r:id="rId4"/>
     <p:sldId id="267" r:id="rId5"/>
     <p:sldId id="268" r:id="rId6"/>
-    <p:sldId id="270" r:id="rId7"/>
-    <p:sldId id="273" r:id="rId8"/>
-    <p:sldId id="281" r:id="rId9"/>
+    <p:sldId id="287" r:id="rId7"/>
+    <p:sldId id="286" r:id="rId8"/>
+    <p:sldId id="273" r:id="rId9"/>
     <p:sldId id="282" r:id="rId10"/>
     <p:sldId id="285" r:id="rId11"/>
     <p:sldId id="277" r:id="rId12"/>
@@ -252,7 +252,7 @@
           <a:p>
             <a:fld id="{CC58B075-67F8-4A8D-AE1C-3D3E4193EBCA}" type="datetimeFigureOut">
               <a:rPr lang="pt-BR" smtClean="0"/>
-              <a:t>03/06/2019</a:t>
+              <a:t>07/06/2019</a:t>
             </a:fld>
             <a:endParaRPr lang="pt-BR"/>
           </a:p>
@@ -420,7 +420,7 @@
           <a:p>
             <a:fld id="{CC58B075-67F8-4A8D-AE1C-3D3E4193EBCA}" type="datetimeFigureOut">
               <a:rPr lang="pt-BR" smtClean="0"/>
-              <a:t>03/06/2019</a:t>
+              <a:t>07/06/2019</a:t>
             </a:fld>
             <a:endParaRPr lang="pt-BR"/>
           </a:p>
@@ -598,7 +598,7 @@
           <a:p>
             <a:fld id="{CC58B075-67F8-4A8D-AE1C-3D3E4193EBCA}" type="datetimeFigureOut">
               <a:rPr lang="pt-BR" smtClean="0"/>
-              <a:t>03/06/2019</a:t>
+              <a:t>07/06/2019</a:t>
             </a:fld>
             <a:endParaRPr lang="pt-BR"/>
           </a:p>
@@ -766,7 +766,7 @@
           <a:p>
             <a:fld id="{CC58B075-67F8-4A8D-AE1C-3D3E4193EBCA}" type="datetimeFigureOut">
               <a:rPr lang="pt-BR" smtClean="0"/>
-              <a:t>03/06/2019</a:t>
+              <a:t>07/06/2019</a:t>
             </a:fld>
             <a:endParaRPr lang="pt-BR"/>
           </a:p>
@@ -1011,7 +1011,7 @@
           <a:p>
             <a:fld id="{CC58B075-67F8-4A8D-AE1C-3D3E4193EBCA}" type="datetimeFigureOut">
               <a:rPr lang="pt-BR" smtClean="0"/>
-              <a:t>03/06/2019</a:t>
+              <a:t>07/06/2019</a:t>
             </a:fld>
             <a:endParaRPr lang="pt-BR"/>
           </a:p>
@@ -1240,7 +1240,7 @@
           <a:p>
             <a:fld id="{CC58B075-67F8-4A8D-AE1C-3D3E4193EBCA}" type="datetimeFigureOut">
               <a:rPr lang="pt-BR" smtClean="0"/>
-              <a:t>03/06/2019</a:t>
+              <a:t>07/06/2019</a:t>
             </a:fld>
             <a:endParaRPr lang="pt-BR"/>
           </a:p>
@@ -1604,7 +1604,7 @@
           <a:p>
             <a:fld id="{CC58B075-67F8-4A8D-AE1C-3D3E4193EBCA}" type="datetimeFigureOut">
               <a:rPr lang="pt-BR" smtClean="0"/>
-              <a:t>03/06/2019</a:t>
+              <a:t>07/06/2019</a:t>
             </a:fld>
             <a:endParaRPr lang="pt-BR"/>
           </a:p>
@@ -1721,7 +1721,7 @@
           <a:p>
             <a:fld id="{CC58B075-67F8-4A8D-AE1C-3D3E4193EBCA}" type="datetimeFigureOut">
               <a:rPr lang="pt-BR" smtClean="0"/>
-              <a:t>03/06/2019</a:t>
+              <a:t>07/06/2019</a:t>
             </a:fld>
             <a:endParaRPr lang="pt-BR"/>
           </a:p>
@@ -1816,7 +1816,7 @@
           <a:p>
             <a:fld id="{CC58B075-67F8-4A8D-AE1C-3D3E4193EBCA}" type="datetimeFigureOut">
               <a:rPr lang="pt-BR" smtClean="0"/>
-              <a:t>03/06/2019</a:t>
+              <a:t>07/06/2019</a:t>
             </a:fld>
             <a:endParaRPr lang="pt-BR"/>
           </a:p>
@@ -2091,7 +2091,7 @@
           <a:p>
             <a:fld id="{CC58B075-67F8-4A8D-AE1C-3D3E4193EBCA}" type="datetimeFigureOut">
               <a:rPr lang="pt-BR" smtClean="0"/>
-              <a:t>03/06/2019</a:t>
+              <a:t>07/06/2019</a:t>
             </a:fld>
             <a:endParaRPr lang="pt-BR"/>
           </a:p>
@@ -2343,7 +2343,7 @@
           <a:p>
             <a:fld id="{CC58B075-67F8-4A8D-AE1C-3D3E4193EBCA}" type="datetimeFigureOut">
               <a:rPr lang="pt-BR" smtClean="0"/>
-              <a:t>03/06/2019</a:t>
+              <a:t>07/06/2019</a:t>
             </a:fld>
             <a:endParaRPr lang="pt-BR"/>
           </a:p>
@@ -2554,7 +2554,7 @@
           <a:p>
             <a:fld id="{CC58B075-67F8-4A8D-AE1C-3D3E4193EBCA}" type="datetimeFigureOut">
               <a:rPr lang="pt-BR" smtClean="0"/>
-              <a:t>03/06/2019</a:t>
+              <a:t>07/06/2019</a:t>
             </a:fld>
             <a:endParaRPr lang="pt-BR"/>
           </a:p>
@@ -4797,7 +4797,6 @@
               <a:rPr lang="pt-BR" sz="2400" dirty="0"/>
               <a:t> script entre diferentes sistemas operacionais.</a:t>
             </a:r>
-            <a:endParaRPr lang="pt-BR" sz="2400" dirty="0"/>
           </a:p>
         </p:txBody>
       </p:sp>
@@ -4870,7 +4869,6 @@
               <a:rPr lang="pt-BR" sz="2800" b="1" dirty="0"/>
               <a:t> server</a:t>
             </a:r>
-            <a:endParaRPr lang="pt-BR" sz="2800" b="1" dirty="0"/>
           </a:p>
         </p:txBody>
       </p:sp>
@@ -4898,7 +4896,7 @@
         </p:spPr>
         <p:txBody>
           <a:bodyPr>
-            <a:normAutofit lnSpcReduction="10000"/>
+            <a:normAutofit fontScale="92500" lnSpcReduction="20000"/>
           </a:bodyPr>
           <a:lstStyle/>
           <a:p>
@@ -5044,30 +5042,76 @@
           </a:p>
           <a:p>
             <a:r>
+              <a:rPr lang="pt-BR" sz="2400" dirty="0" smtClean="0"/>
+              <a:t>A </a:t>
+            </a:r>
+            <a:r>
               <a:rPr lang="pt-BR" sz="2400" dirty="0"/>
-              <a:t>A criação de um script para executar o </a:t>
-            </a:r>
-            <a:r>
-              <a:rPr lang="pt-BR" sz="2400" dirty="0" smtClean="0"/>
-              <a:t>servidor</a:t>
-            </a:r>
-          </a:p>
-          <a:p>
-            <a:endParaRPr lang="pt-BR" sz="2400" dirty="0"/>
-          </a:p>
-          <a:p>
-            <a:r>
-              <a:rPr lang="pt-BR" sz="2400" dirty="0"/>
-              <a:t>A importância da propriedade </a:t>
+              <a:t>importância da propriedade </a:t>
             </a:r>
             <a:r>
               <a:rPr lang="pt-BR" sz="2400" b="1" dirty="0" err="1"/>
               <a:t>publicPath</a:t>
             </a:r>
             <a:r>
+              <a:rPr lang="pt-BR" sz="2400" dirty="0" smtClean="0"/>
+              <a:t>.</a:t>
+            </a:r>
+          </a:p>
+          <a:p>
+            <a:endParaRPr lang="pt-BR" sz="2400" dirty="0" smtClean="0"/>
+          </a:p>
+          <a:p>
+            <a:r>
+              <a:rPr lang="pt-BR" sz="2400" dirty="0" err="1"/>
+              <a:t>Webpack</a:t>
+            </a:r>
+            <a:r>
               <a:rPr lang="pt-BR" sz="2400" dirty="0"/>
+              <a:t> </a:t>
+            </a:r>
+            <a:r>
+              <a:rPr lang="pt-BR" sz="2400" dirty="0" err="1"/>
+              <a:t>Dev</a:t>
+            </a:r>
+            <a:r>
+              <a:rPr lang="pt-BR" sz="2400" dirty="0"/>
+              <a:t> Server é um servidor capaz de ler as configurações de webpack.config.js ao ser carregado</a:t>
+            </a:r>
+            <a:r>
+              <a:rPr lang="pt-BR" sz="2400" dirty="0" smtClean="0"/>
               <a:t>.</a:t>
             </a:r>
+          </a:p>
+          <a:p>
+            <a:r>
+              <a:rPr lang="pt-BR" sz="2400" dirty="0" err="1"/>
+              <a:t>Webpack</a:t>
+            </a:r>
+            <a:r>
+              <a:rPr lang="pt-BR" sz="2400" dirty="0"/>
+              <a:t> </a:t>
+            </a:r>
+            <a:r>
+              <a:rPr lang="pt-BR" sz="2400" dirty="0" err="1"/>
+              <a:t>Dev</a:t>
+            </a:r>
+            <a:r>
+              <a:rPr lang="pt-BR" sz="2400" dirty="0"/>
+              <a:t> server é baixado através do </a:t>
+            </a:r>
+            <a:r>
+              <a:rPr lang="pt-BR" sz="2400" dirty="0" err="1"/>
+              <a:t>npm</a:t>
+            </a:r>
+            <a:r>
+              <a:rPr lang="pt-BR" sz="2400" dirty="0"/>
+              <a:t>, pois é nada mais nada menos do que um módulo do Node.js.</a:t>
+            </a:r>
+            <a:endParaRPr lang="pt-BR" sz="2400" dirty="0" smtClean="0"/>
+          </a:p>
+          <a:p>
+            <a:endParaRPr lang="pt-BR" sz="2400" dirty="0"/>
           </a:p>
           <a:p>
             <a:endParaRPr lang="pt-BR" sz="2400" dirty="0"/>
@@ -5128,9 +5172,34 @@
           <a:p>
             <a:pPr algn="ctr"/>
             <a:r>
-              <a:rPr lang="pt-BR" sz="2800" b="1" dirty="0"/>
-              <a:t>Persistência</a:t>
-            </a:r>
+              <a:rPr lang="pt-BR" sz="2800" b="1" dirty="0" smtClean="0"/>
+              <a:t>FOUC ( Flash </a:t>
+            </a:r>
+            <a:r>
+              <a:rPr lang="pt-BR" sz="2800" b="1" dirty="0" err="1" smtClean="0"/>
+              <a:t>of</a:t>
+            </a:r>
+            <a:r>
+              <a:rPr lang="pt-BR" sz="2800" b="1" dirty="0" smtClean="0"/>
+              <a:t> </a:t>
+            </a:r>
+            <a:r>
+              <a:rPr lang="pt-BR" sz="2800" b="1" dirty="0" err="1" smtClean="0"/>
+              <a:t>Unstyled</a:t>
+            </a:r>
+            <a:r>
+              <a:rPr lang="pt-BR" sz="2800" b="1" dirty="0" smtClean="0"/>
+              <a:t> </a:t>
+            </a:r>
+            <a:r>
+              <a:rPr lang="pt-BR" sz="2800" b="1" dirty="0" err="1" smtClean="0"/>
+              <a:t>Content</a:t>
+            </a:r>
+            <a:r>
+              <a:rPr lang="pt-BR" sz="2800" b="1" dirty="0" smtClean="0"/>
+              <a:t>)</a:t>
+            </a:r>
+            <a:endParaRPr lang="pt-BR" sz="2800" b="1" dirty="0"/>
           </a:p>
         </p:txBody>
       </p:sp>
@@ -5152,99 +5221,136 @@
         </p:nvSpPr>
         <p:spPr>
           <a:xfrm>
-            <a:off x="563671" y="801666"/>
+            <a:off x="484648" y="941366"/>
             <a:ext cx="10790129" cy="5375297"/>
           </a:xfrm>
         </p:spPr>
         <p:txBody>
-          <a:bodyPr/>
-          <a:lstStyle/>
+          <a:bodyPr>
+            <a:normAutofit/>
+          </a:bodyPr>
+          <a:lstStyle/>
+          <a:p>
+            <a:r>
+              <a:rPr lang="pt-BR" sz="2400" dirty="0" smtClean="0"/>
+              <a:t>O bundle.js quando foi </a:t>
+            </a:r>
+            <a:r>
+              <a:rPr lang="pt-BR" sz="2400" dirty="0" err="1" smtClean="0"/>
+              <a:t>minificado</a:t>
+            </a:r>
+            <a:r>
+              <a:rPr lang="pt-BR" sz="2400" dirty="0" smtClean="0"/>
+              <a:t> inseriu o </a:t>
+            </a:r>
+            <a:r>
+              <a:rPr lang="pt-BR" sz="2400" dirty="0" err="1" smtClean="0"/>
+              <a:t>css</a:t>
+            </a:r>
+            <a:r>
+              <a:rPr lang="pt-BR" sz="2400" dirty="0" smtClean="0"/>
+              <a:t> dentro do </a:t>
+            </a:r>
+            <a:r>
+              <a:rPr lang="pt-BR" sz="2400" dirty="0" err="1" smtClean="0"/>
+              <a:t>bundle</a:t>
+            </a:r>
+            <a:endParaRPr lang="pt-BR" sz="2400" dirty="0" smtClean="0"/>
+          </a:p>
+          <a:p>
+            <a:endParaRPr lang="pt-BR" sz="2400" dirty="0" smtClean="0"/>
+          </a:p>
+          <a:p>
+            <a:r>
+              <a:rPr lang="pt-BR" sz="2400" dirty="0" smtClean="0"/>
+              <a:t>Por isso há um pequeno </a:t>
+            </a:r>
+            <a:r>
+              <a:rPr lang="pt-BR" sz="2400" dirty="0" err="1" smtClean="0"/>
+              <a:t>delay</a:t>
+            </a:r>
+            <a:r>
+              <a:rPr lang="pt-BR" sz="2400" dirty="0" smtClean="0"/>
+              <a:t> pra carregar o </a:t>
+            </a:r>
+            <a:r>
+              <a:rPr lang="pt-BR" sz="2400" dirty="0" err="1" smtClean="0"/>
+              <a:t>css</a:t>
+            </a:r>
+            <a:r>
+              <a:rPr lang="pt-BR" sz="2400" dirty="0" smtClean="0"/>
+              <a:t> da aplicação</a:t>
+            </a:r>
+          </a:p>
+          <a:p>
+            <a:endParaRPr lang="pt-BR" sz="2400" dirty="0" smtClean="0"/>
+          </a:p>
           <a:p>
             <a:r>
               <a:rPr lang="pt-BR" sz="2400" dirty="0"/>
-              <a:t>Persistência com o banco de dados bastante famoso no mercado e certificado pela W3C, </a:t>
-            </a:r>
-            <a:r>
-              <a:rPr lang="pt-BR" sz="2400" b="1" dirty="0" err="1"/>
-              <a:t>IndexedDB</a:t>
+              <a:t>FOUC significa flash </a:t>
+            </a:r>
+            <a:r>
+              <a:rPr lang="pt-BR" sz="2400" dirty="0" err="1"/>
+              <a:t>of</a:t>
             </a:r>
             <a:r>
               <a:rPr lang="pt-BR" sz="2400" dirty="0"/>
-              <a:t> (</a:t>
-            </a:r>
-            <a:r>
-              <a:rPr lang="pt-BR" sz="2400" b="1" dirty="0"/>
-              <a:t>IDB</a:t>
+              <a:t> </a:t>
+            </a:r>
+            <a:r>
+              <a:rPr lang="pt-BR" sz="2400" dirty="0" err="1"/>
+              <a:t>unstyled</a:t>
             </a:r>
             <a:r>
               <a:rPr lang="pt-BR" sz="2400" dirty="0"/>
-              <a:t>).</a:t>
-            </a:r>
-          </a:p>
-          <a:p>
+              <a:t> </a:t>
+            </a:r>
+            <a:r>
+              <a:rPr lang="pt-BR" sz="2400" dirty="0" err="1"/>
+              <a:t>content</a:t>
+            </a:r>
             <a:r>
               <a:rPr lang="pt-BR" sz="2400" dirty="0"/>
-              <a:t>É acessível pelo escopo global</a:t>
-            </a:r>
-          </a:p>
-          <a:p>
-            <a:r>
-              <a:rPr lang="pt-BR" sz="2400" dirty="0"/>
-              <a:t>Precisamos solicitar uma requisição de abertura para um Banco antes de qualquer coisa</a:t>
-            </a:r>
-          </a:p>
-          <a:p>
-            <a:r>
-              <a:rPr lang="pt-BR" sz="2400" dirty="0"/>
-              <a:t>Temos que lidar com uma tríade de eventos todas as vezes que obtermos uma conexão</a:t>
-            </a:r>
-          </a:p>
-          <a:p>
-            <a:pPr lvl="1"/>
+              <a:t>. É quando há um hiato entre o carregamento do CSS e sua aplicação na página, permitindo que o usuário veja a página sem estar estilizada durante um breve tempo</a:t>
+            </a:r>
+            <a:r>
+              <a:rPr lang="pt-BR" sz="2400" dirty="0" smtClean="0"/>
+              <a:t>.</a:t>
+            </a:r>
+          </a:p>
+          <a:p>
+            <a:endParaRPr lang="pt-BR" sz="2400" dirty="0"/>
+          </a:p>
+          <a:p>
+            <a:r>
+              <a:rPr lang="pt-BR" dirty="0"/>
+              <a:t>Por mais que o </a:t>
+            </a:r>
             <a:r>
               <a:rPr lang="pt-BR" dirty="0" err="1"/>
-              <a:t>openRequest.</a:t>
-            </a:r>
-            <a:r>
-              <a:rPr lang="pt-BR" b="1" dirty="0" err="1"/>
-              <a:t>onupgradeneeded</a:t>
-            </a:r>
-            <a:endParaRPr lang="pt-BR" b="1" dirty="0"/>
-          </a:p>
-          <a:p>
-            <a:pPr lvl="1"/>
+              <a:t>webpack</a:t>
+            </a:r>
+            <a:r>
+              <a:rPr lang="pt-BR" dirty="0"/>
+              <a:t> adicione arquivos CSS importados no </a:t>
+            </a:r>
             <a:r>
               <a:rPr lang="pt-BR" dirty="0" err="1"/>
-              <a:t>openRequest.</a:t>
-            </a:r>
-            <a:r>
-              <a:rPr lang="pt-BR" b="1" dirty="0" err="1"/>
-              <a:t>onsuccess</a:t>
-            </a:r>
-            <a:endParaRPr lang="pt-BR" b="1" dirty="0"/>
-          </a:p>
-          <a:p>
-            <a:pPr lvl="1"/>
-            <a:r>
-              <a:rPr lang="pt-BR" dirty="0" err="1"/>
-              <a:t>openRequest.</a:t>
-            </a:r>
-            <a:r>
-              <a:rPr lang="pt-BR" b="1" dirty="0" err="1"/>
-              <a:t>onerror</a:t>
-            </a:r>
-            <a:endParaRPr lang="pt-BR" b="1" dirty="0"/>
-          </a:p>
-          <a:p>
-            <a:pPr lvl="1"/>
-            <a:endParaRPr lang="pt-BR" sz="2000" dirty="0"/>
+              <a:t>bundle</a:t>
+            </a:r>
+            <a:r>
+              <a:rPr lang="pt-BR" dirty="0"/>
+              <a:t> da aplicação, é interessante adicioná-los em um arquivo CSS separado para podermos usufruir de todas as otimizações realizadas pelos navegadores a respeito do carregamento de folhas de estilo.</a:t>
+            </a:r>
+            <a:endParaRPr lang="pt-BR" sz="2400" dirty="0"/>
           </a:p>
         </p:txBody>
       </p:sp>
     </p:spTree>
     <p:extLst>
       <p:ext uri="{BB962C8B-B14F-4D97-AF65-F5344CB8AC3E}">
-        <p14:creationId xmlns:p14="http://schemas.microsoft.com/office/powerpoint/2010/main" val="266674773"/>
+        <p14:creationId xmlns:p14="http://schemas.microsoft.com/office/powerpoint/2010/main" val="2115503630"/>
       </p:ext>
     </p:extLst>
   </p:cSld>
@@ -5283,8 +5389,8 @@
         </p:nvSpPr>
         <p:spPr>
           <a:xfrm>
-            <a:off x="759177" y="89552"/>
-            <a:ext cx="10515600" cy="549275"/>
+            <a:off x="838200" y="365125"/>
+            <a:ext cx="10515600" cy="841883"/>
           </a:xfrm>
         </p:spPr>
         <p:txBody>
@@ -5293,23 +5399,17 @@
           </a:bodyPr>
           <a:lstStyle/>
           <a:p>
-            <a:pPr algn="ctr"/>
-            <a:r>
-              <a:rPr lang="pt-BR" sz="2800" b="1" dirty="0"/>
-              <a:t>Uma conexão ou várias</a:t>
-            </a:r>
-          </a:p>
-        </p:txBody>
-      </p:sp>
-      <p:sp>
-        <p:nvSpPr>
-          <p:cNvPr id="7" name="Espaço Reservado para Conteúdo 6">
-            <a:extLst>
-              <a:ext uri="{FF2B5EF4-FFF2-40B4-BE49-F238E27FC236}">
-                <a16:creationId xmlns:a16="http://schemas.microsoft.com/office/drawing/2014/main" id="{CBDD146F-E87E-0140-B521-E123E7DC95E8}"/>
-              </a:ext>
-            </a:extLst>
-          </p:cNvPr>
+            <a:r>
+              <a:rPr lang="pt-BR" sz="4000" dirty="0" smtClean="0"/>
+              <a:t>Revisão</a:t>
+            </a:r>
+            <a:endParaRPr lang="pt-BR" sz="4000" dirty="0"/>
+          </a:p>
+        </p:txBody>
+      </p:sp>
+      <p:sp>
+        <p:nvSpPr>
+          <p:cNvPr id="3" name="Espaço Reservado para Conteúdo 2"/>
           <p:cNvSpPr>
             <a:spLocks noGrp="1"/>
           </p:cNvSpPr>
@@ -5319,297 +5419,182 @@
         </p:nvSpPr>
         <p:spPr>
           <a:xfrm>
-            <a:off x="563671" y="801666"/>
-            <a:ext cx="10790129" cy="5649238"/>
+            <a:off x="630936" y="1207008"/>
+            <a:ext cx="10515600" cy="4351338"/>
           </a:xfrm>
         </p:spPr>
         <p:txBody>
           <a:bodyPr/>
           <a:lstStyle/>
           <a:p>
-            <a:pPr marL="0" indent="0">
-              <a:buNone/>
-            </a:pPr>
-            <a:r>
-              <a:rPr lang="pt-BR" dirty="0" err="1">
-                <a:solidFill>
-                  <a:srgbClr val="A67F59"/>
-                </a:solidFill>
-              </a:rPr>
-              <a:t>ConnectionFactory</a:t>
+            <a:r>
+              <a:rPr lang="pt-BR" dirty="0"/>
+              <a:t>Como utilizar o </a:t>
+            </a:r>
+            <a:r>
+              <a:rPr lang="pt-BR" dirty="0" err="1"/>
+              <a:t>npm</a:t>
+            </a:r>
+            <a:r>
+              <a:rPr lang="pt-BR" dirty="0"/>
+              <a:t> para gerenciar nossas dependências </a:t>
+            </a:r>
+            <a:r>
+              <a:rPr lang="pt-BR" dirty="0" err="1"/>
+              <a:t>frontend</a:t>
+            </a:r>
+            <a:endParaRPr lang="pt-BR" dirty="0"/>
+          </a:p>
+          <a:p>
+            <a:r>
+              <a:rPr lang="pt-BR" dirty="0"/>
+              <a:t>Como o </a:t>
+            </a:r>
+            <a:r>
+              <a:rPr lang="pt-BR" dirty="0" err="1"/>
+              <a:t>Webpack</a:t>
+            </a:r>
+            <a:r>
+              <a:rPr lang="pt-BR" dirty="0"/>
+              <a:t> lida com as dependências em </a:t>
+            </a:r>
+            <a:r>
+              <a:rPr lang="pt-BR" dirty="0" err="1"/>
+              <a:t>node_modules</a:t>
             </a:r>
             <a:r>
               <a:rPr lang="pt-BR" dirty="0"/>
               <a:t> </a:t>
             </a:r>
-          </a:p>
-          <a:p>
-            <a:pPr marL="0" indent="0">
-              <a:buNone/>
-            </a:pPr>
-            <a:r>
-              <a:rPr lang="pt-BR" dirty="0">
-                <a:solidFill>
-                  <a:srgbClr val="999999"/>
-                </a:solidFill>
-              </a:rPr>
-              <a:t>	.</a:t>
-            </a:r>
             <a:r>
               <a:rPr lang="pt-BR" dirty="0" err="1"/>
-              <a:t>getConnection</a:t>
-            </a:r>
-            <a:r>
-              <a:rPr lang="pt-BR" dirty="0">
-                <a:solidFill>
-                  <a:srgbClr val="999999"/>
-                </a:solidFill>
-              </a:rPr>
-              <a:t>()</a:t>
+              <a:t>adicionado-as</a:t>
+            </a:r>
+            <a:r>
+              <a:rPr lang="pt-BR" dirty="0"/>
+              <a:t> no </a:t>
+            </a:r>
+            <a:r>
+              <a:rPr lang="pt-BR" dirty="0" err="1"/>
+              <a:t>bundle</a:t>
+            </a:r>
+            <a:r>
+              <a:rPr lang="pt-BR" dirty="0"/>
+              <a:t> da aplicação.</a:t>
+            </a:r>
+          </a:p>
+          <a:p>
+            <a:r>
+              <a:rPr lang="pt-BR" dirty="0"/>
+              <a:t>O papel de </a:t>
+            </a:r>
+            <a:r>
+              <a:rPr lang="pt-BR" dirty="0" err="1"/>
+              <a:t>loaders</a:t>
+            </a:r>
+            <a:endParaRPr lang="pt-BR" dirty="0"/>
+          </a:p>
+          <a:p>
+            <a:r>
+              <a:rPr lang="pt-BR" dirty="0"/>
+              <a:t>Que o padrão é adicionar no </a:t>
+            </a:r>
+            <a:r>
+              <a:rPr lang="pt-BR" dirty="0" err="1"/>
+              <a:t>bundle</a:t>
+            </a:r>
+            <a:r>
+              <a:rPr lang="pt-BR" dirty="0"/>
+              <a:t> scripts e </a:t>
+            </a:r>
+            <a:r>
+              <a:rPr lang="pt-BR" dirty="0" err="1"/>
+              <a:t>CSS's</a:t>
+            </a:r>
+            <a:endParaRPr lang="pt-BR" dirty="0"/>
+          </a:p>
+          <a:p>
+            <a:r>
+              <a:rPr lang="pt-BR" dirty="0"/>
+              <a:t>Que podemos separar </a:t>
+            </a:r>
+            <a:r>
+              <a:rPr lang="pt-BR" dirty="0" err="1"/>
+              <a:t>CSS's</a:t>
+            </a:r>
+            <a:r>
+              <a:rPr lang="pt-BR" dirty="0"/>
+              <a:t> do </a:t>
+            </a:r>
+            <a:r>
+              <a:rPr lang="pt-BR" dirty="0" err="1"/>
+              <a:t>bundle</a:t>
+            </a:r>
+            <a:r>
+              <a:rPr lang="pt-BR" dirty="0"/>
+              <a:t> criado e importá-los através da </a:t>
+            </a:r>
+            <a:r>
+              <a:rPr lang="pt-BR" dirty="0" err="1"/>
+              <a:t>tag</a:t>
+            </a:r>
+            <a:r>
+              <a:rPr lang="pt-BR" dirty="0"/>
+              <a:t> link através do módulo </a:t>
+            </a:r>
+            <a:r>
+              <a:rPr lang="pt-BR" dirty="0" err="1"/>
+              <a:t>extract-text-webpack-plugin</a:t>
+            </a:r>
+            <a:r>
+              <a:rPr lang="pt-BR" dirty="0"/>
+              <a:t>.</a:t>
+            </a:r>
+          </a:p>
+          <a:p>
+            <a:r>
+              <a:rPr lang="pt-BR" dirty="0"/>
+              <a:t>A utilizar o </a:t>
+            </a:r>
+            <a:r>
+              <a:rPr lang="pt-BR" dirty="0" err="1"/>
+              <a:t>plugin</a:t>
             </a:r>
             <a:r>
               <a:rPr lang="pt-BR" dirty="0"/>
               <a:t> </a:t>
             </a:r>
-          </a:p>
-          <a:p>
-            <a:pPr marL="457200" lvl="1" indent="0">
-              <a:buNone/>
-            </a:pPr>
-            <a:r>
-              <a:rPr lang="pt-BR" dirty="0">
-                <a:solidFill>
-                  <a:srgbClr val="999999"/>
-                </a:solidFill>
-              </a:rPr>
-              <a:t>	.</a:t>
-            </a:r>
-            <a:r>
-              <a:rPr lang="pt-BR" dirty="0" err="1">
-                <a:solidFill>
-                  <a:srgbClr val="0077AA"/>
-                </a:solidFill>
-              </a:rPr>
-              <a:t>then</a:t>
-            </a:r>
-            <a:r>
-              <a:rPr lang="pt-BR" dirty="0">
-                <a:solidFill>
-                  <a:srgbClr val="999999"/>
-                </a:solidFill>
-              </a:rPr>
-              <a:t>(</a:t>
+            <a:r>
+              <a:rPr lang="pt-BR" dirty="0" err="1"/>
+              <a:t>optimize-css-assets-webpack-plugin</a:t>
             </a:r>
             <a:r>
               <a:rPr lang="pt-BR" dirty="0"/>
-              <a:t>connection </a:t>
-            </a:r>
-            <a:r>
-              <a:rPr lang="pt-BR" dirty="0">
-                <a:solidFill>
-                  <a:srgbClr val="999999"/>
-                </a:solidFill>
-              </a:rPr>
-              <a:t>=&gt;</a:t>
+              <a:t> para </a:t>
+            </a:r>
+            <a:r>
+              <a:rPr lang="pt-BR" dirty="0" err="1"/>
+              <a:t>minificar</a:t>
             </a:r>
             <a:r>
               <a:rPr lang="pt-BR" dirty="0"/>
               <a:t> </a:t>
             </a:r>
             <a:r>
-              <a:rPr lang="pt-BR" dirty="0">
-                <a:solidFill>
-                  <a:srgbClr val="999999"/>
-                </a:solidFill>
-              </a:rPr>
-              <a:t>{</a:t>
+              <a:rPr lang="pt-BR" dirty="0" err="1"/>
+              <a:t>CSS's</a:t>
             </a:r>
             <a:r>
               <a:rPr lang="pt-BR" dirty="0"/>
-              <a:t> </a:t>
-            </a:r>
-          </a:p>
-          <a:p>
-            <a:pPr marL="457200" lvl="1" indent="0">
-              <a:buNone/>
-            </a:pPr>
-            <a:r>
-              <a:rPr lang="pt-BR" dirty="0">
-                <a:solidFill>
-                  <a:srgbClr val="999999"/>
-                </a:solidFill>
-              </a:rPr>
-              <a:t>});</a:t>
-            </a:r>
-            <a:r>
-              <a:rPr lang="pt-BR" dirty="0"/>
-              <a:t> </a:t>
-            </a:r>
-          </a:p>
-          <a:p>
-            <a:pPr marL="457200" lvl="1" indent="0">
-              <a:buNone/>
-            </a:pPr>
-            <a:endParaRPr lang="pt-BR" dirty="0">
-              <a:solidFill>
-                <a:srgbClr val="708090"/>
-              </a:solidFill>
-            </a:endParaRPr>
-          </a:p>
-          <a:p>
-            <a:pPr marL="457200" lvl="1" indent="0">
-              <a:buNone/>
-            </a:pPr>
-            <a:r>
-              <a:rPr lang="pt-BR" dirty="0">
-                <a:solidFill>
-                  <a:srgbClr val="708090"/>
-                </a:solidFill>
-              </a:rPr>
-              <a:t>// faz outras coisas e pede novamente a conexão</a:t>
-            </a:r>
-            <a:r>
-              <a:rPr lang="pt-BR" dirty="0"/>
-              <a:t> </a:t>
-            </a:r>
-          </a:p>
-          <a:p>
-            <a:pPr marL="457200" lvl="1" indent="0">
-              <a:buNone/>
-            </a:pPr>
-            <a:endParaRPr lang="pt-BR" sz="2800" dirty="0">
-              <a:solidFill>
-                <a:srgbClr val="A67F59"/>
-              </a:solidFill>
-            </a:endParaRPr>
-          </a:p>
-          <a:p>
-            <a:pPr marL="457200" lvl="1" indent="0">
-              <a:buNone/>
-            </a:pPr>
-            <a:r>
-              <a:rPr lang="pt-BR" sz="2800" dirty="0" err="1">
-                <a:solidFill>
-                  <a:srgbClr val="A67F59"/>
-                </a:solidFill>
-              </a:rPr>
-              <a:t>ConnectionFactory</a:t>
-            </a:r>
-            <a:r>
-              <a:rPr lang="pt-BR" sz="2800" dirty="0"/>
-              <a:t> </a:t>
-            </a:r>
-          </a:p>
-          <a:p>
-            <a:pPr marL="457200" lvl="1" indent="0">
-              <a:buNone/>
-            </a:pPr>
-            <a:r>
-              <a:rPr lang="pt-BR" sz="2800" dirty="0">
-                <a:solidFill>
-                  <a:srgbClr val="999999"/>
-                </a:solidFill>
-              </a:rPr>
-              <a:t>	.</a:t>
-            </a:r>
-            <a:r>
-              <a:rPr lang="pt-BR" sz="2800" dirty="0" err="1"/>
-              <a:t>getConnection</a:t>
-            </a:r>
-            <a:r>
-              <a:rPr lang="pt-BR" sz="2800" dirty="0">
-                <a:solidFill>
-                  <a:srgbClr val="999999"/>
-                </a:solidFill>
-              </a:rPr>
-              <a:t>()</a:t>
-            </a:r>
-            <a:r>
-              <a:rPr lang="pt-BR" sz="2800" dirty="0"/>
-              <a:t> </a:t>
-            </a:r>
-          </a:p>
-          <a:p>
-            <a:pPr marL="457200" lvl="1" indent="0">
-              <a:buNone/>
-            </a:pPr>
-            <a:r>
-              <a:rPr lang="pt-BR" sz="2800" dirty="0">
-                <a:solidFill>
-                  <a:srgbClr val="999999"/>
-                </a:solidFill>
-              </a:rPr>
-              <a:t>	.</a:t>
-            </a:r>
-            <a:r>
-              <a:rPr lang="pt-BR" sz="2800" dirty="0" err="1">
-                <a:solidFill>
-                  <a:srgbClr val="0077AA"/>
-                </a:solidFill>
-              </a:rPr>
-              <a:t>then</a:t>
-            </a:r>
-            <a:r>
-              <a:rPr lang="pt-BR" sz="2800" dirty="0">
-                <a:solidFill>
-                  <a:srgbClr val="999999"/>
-                </a:solidFill>
-              </a:rPr>
-              <a:t>(</a:t>
-            </a:r>
-            <a:r>
-              <a:rPr lang="pt-BR" sz="2800" dirty="0"/>
-              <a:t>connection </a:t>
-            </a:r>
-            <a:r>
-              <a:rPr lang="pt-BR" sz="2800" dirty="0">
-                <a:solidFill>
-                  <a:srgbClr val="999999"/>
-                </a:solidFill>
-              </a:rPr>
-              <a:t>=&gt;</a:t>
-            </a:r>
-            <a:r>
-              <a:rPr lang="pt-BR" sz="2800" dirty="0"/>
-              <a:t> </a:t>
-            </a:r>
-            <a:r>
-              <a:rPr lang="pt-BR" sz="2800" dirty="0">
-                <a:solidFill>
-                  <a:srgbClr val="999999"/>
-                </a:solidFill>
-              </a:rPr>
-              <a:t>{</a:t>
-            </a:r>
-            <a:r>
-              <a:rPr lang="pt-BR" sz="2800" dirty="0"/>
-              <a:t> </a:t>
-            </a:r>
-          </a:p>
-          <a:p>
-            <a:pPr marL="457200" lvl="1" indent="0">
-              <a:buNone/>
-            </a:pPr>
-            <a:r>
-              <a:rPr lang="pt-BR" sz="2800" dirty="0">
-                <a:solidFill>
-                  <a:srgbClr val="999999"/>
-                </a:solidFill>
-              </a:rPr>
-              <a:t>});</a:t>
-            </a:r>
-            <a:endParaRPr lang="pt-BR" sz="2800" dirty="0">
-              <a:solidFill>
-                <a:schemeClr val="accent5"/>
-              </a:solidFill>
-            </a:endParaRPr>
+              <a:t> importados se adicionados no style.css.</a:t>
+            </a:r>
           </a:p>
         </p:txBody>
       </p:sp>
     </p:spTree>
     <p:extLst>
       <p:ext uri="{BB962C8B-B14F-4D97-AF65-F5344CB8AC3E}">
-        <p14:creationId xmlns:p14="http://schemas.microsoft.com/office/powerpoint/2010/main" val="1564479947"/>
+        <p14:creationId xmlns:p14="http://schemas.microsoft.com/office/powerpoint/2010/main" val="1917513607"/>
       </p:ext>
     </p:extLst>
   </p:cSld>
@@ -5661,189 +5646,320 @@
             <a:pPr algn="ctr"/>
             <a:r>
               <a:rPr lang="pt-BR" sz="2800" b="1" dirty="0"/>
-              <a:t>Variáveis imutáveis =&gt; Constantes</a:t>
-            </a:r>
-          </a:p>
-        </p:txBody>
-      </p:sp>
-      <p:sp>
-        <p:nvSpPr>
-          <p:cNvPr id="8" name="CaixaDeTexto 7"/>
-          <p:cNvSpPr txBox="1"/>
-          <p:nvPr/>
+              <a:t>Uma conexão ou várias</a:t>
+            </a:r>
+          </a:p>
+        </p:txBody>
+      </p:sp>
+      <p:sp>
+        <p:nvSpPr>
+          <p:cNvPr id="7" name="Espaço Reservado para Conteúdo 6">
+            <a:extLst>
+              <a:ext uri="{FF2B5EF4-FFF2-40B4-BE49-F238E27FC236}">
+                <a16:creationId xmlns:a16="http://schemas.microsoft.com/office/drawing/2014/main" id="{CBDD146F-E87E-0140-B521-E123E7DC95E8}"/>
+              </a:ext>
+            </a:extLst>
+          </p:cNvPr>
+          <p:cNvSpPr>
+            <a:spLocks noGrp="1"/>
+          </p:cNvSpPr>
+          <p:nvPr>
+            <p:ph idx="1"/>
+          </p:nvPr>
         </p:nvSpPr>
         <p:spPr>
           <a:xfrm>
-            <a:off x="759177" y="779940"/>
-            <a:ext cx="9931401" cy="3693319"/>
+            <a:off x="563671" y="801666"/>
+            <a:ext cx="10790129" cy="5649238"/>
           </a:xfrm>
-          <a:prstGeom prst="rect">
-            <a:avLst/>
-          </a:prstGeom>
-          <a:noFill/>
         </p:spPr>
         <p:txBody>
-          <a:bodyPr wrap="square" rtlCol="0">
-            <a:spAutoFit/>
-          </a:bodyPr>
-          <a:lstStyle/>
-          <a:p>
-            <a:r>
-              <a:rPr lang="pt-BR" i="1" dirty="0" err="1">
-                <a:solidFill>
-                  <a:schemeClr val="accent5"/>
-                </a:solidFill>
-              </a:rPr>
-              <a:t>const</a:t>
-            </a:r>
-            <a:r>
-              <a:rPr lang="pt-BR" i="1" dirty="0">
-                <a:solidFill>
-                  <a:schemeClr val="accent5"/>
-                </a:solidFill>
-              </a:rPr>
-              <a:t> hoje = new Date();</a:t>
-            </a:r>
-          </a:p>
-          <a:p>
-            <a:r>
-              <a:rPr lang="pt-BR" i="1" dirty="0">
-                <a:solidFill>
-                  <a:schemeClr val="accent5"/>
-                </a:solidFill>
-              </a:rPr>
-              <a:t>hoje = new Date() ; // dá erro!</a:t>
-            </a:r>
-          </a:p>
-          <a:p>
-            <a:endParaRPr lang="pt-BR" dirty="0"/>
-          </a:p>
-          <a:p>
-            <a:r>
-              <a:rPr lang="pt-BR" dirty="0"/>
-              <a:t>Mas,  </a:t>
-            </a:r>
-          </a:p>
-          <a:p>
-            <a:endParaRPr lang="pt-BR" dirty="0"/>
-          </a:p>
-          <a:p>
-            <a:r>
-              <a:rPr lang="pt-BR" i="1" dirty="0" err="1">
-                <a:solidFill>
-                  <a:schemeClr val="accent5"/>
-                </a:solidFill>
-              </a:rPr>
-              <a:t>const</a:t>
-            </a:r>
-            <a:r>
-              <a:rPr lang="pt-BR" i="1" dirty="0">
-                <a:solidFill>
-                  <a:schemeClr val="accent5"/>
-                </a:solidFill>
-              </a:rPr>
-              <a:t> hoje = new Date();</a:t>
-            </a:r>
-          </a:p>
-          <a:p>
-            <a:r>
-              <a:rPr lang="pt-BR" i="1" dirty="0" err="1">
-                <a:solidFill>
-                  <a:schemeClr val="accent5"/>
-                </a:solidFill>
-              </a:rPr>
-              <a:t>Hoje.setDate</a:t>
-            </a:r>
-            <a:r>
-              <a:rPr lang="pt-BR" i="1" dirty="0">
-                <a:solidFill>
-                  <a:schemeClr val="accent5"/>
-                </a:solidFill>
-              </a:rPr>
-              <a:t>(5);</a:t>
-            </a:r>
-          </a:p>
-          <a:p>
-            <a:r>
-              <a:rPr lang="pt-BR" i="1" dirty="0">
-                <a:solidFill>
-                  <a:schemeClr val="accent5"/>
-                </a:solidFill>
-              </a:rPr>
-              <a:t>console.log(</a:t>
-            </a:r>
-            <a:r>
-              <a:rPr lang="pt-BR" i="1" dirty="0" err="1">
-                <a:solidFill>
-                  <a:schemeClr val="accent5"/>
-                </a:solidFill>
-              </a:rPr>
-              <a:t>hoje.getDate</a:t>
-            </a:r>
-            <a:r>
-              <a:rPr lang="pt-BR" i="1" dirty="0">
-                <a:solidFill>
-                  <a:schemeClr val="accent5"/>
-                </a:solidFill>
-              </a:rPr>
-              <a:t>()); // Alterou para o dia 5!</a:t>
-            </a:r>
-          </a:p>
-          <a:p>
-            <a:endParaRPr lang="pt-BR" dirty="0"/>
-          </a:p>
-          <a:p>
-            <a:endParaRPr lang="pt-BR" dirty="0"/>
-          </a:p>
-          <a:p>
-            <a:r>
-              <a:rPr lang="pt-BR" dirty="0"/>
-              <a:t>Neste caso não estamos atribuindo um novo valor para a variável, como fizemos com o operador “</a:t>
-            </a:r>
-            <a:r>
-              <a:rPr lang="pt-BR" b="1" dirty="0"/>
-              <a:t>=</a:t>
-            </a:r>
-            <a:r>
-              <a:rPr lang="pt-BR" dirty="0"/>
-              <a:t>“, mas alterando as propriedades do objeto </a:t>
-            </a:r>
-            <a:r>
-              <a:rPr lang="pt-BR" b="1" i="1" dirty="0">
-                <a:solidFill>
-                  <a:schemeClr val="accent5"/>
-                </a:solidFill>
-              </a:rPr>
-              <a:t>Date</a:t>
-            </a:r>
-            <a:r>
-              <a:rPr lang="pt-BR" dirty="0"/>
-              <a:t>, por meio dos seus métodos. Ou seja, </a:t>
-            </a:r>
-            <a:r>
-              <a:rPr lang="pt-BR" b="1" dirty="0" err="1"/>
-              <a:t>const</a:t>
+          <a:bodyPr/>
+          <a:lstStyle/>
+          <a:p>
+            <a:pPr marL="0" indent="0">
+              <a:buNone/>
+            </a:pPr>
+            <a:r>
+              <a:rPr lang="pt-BR" dirty="0" err="1">
+                <a:solidFill>
+                  <a:srgbClr val="A67F59"/>
+                </a:solidFill>
+              </a:rPr>
+              <a:t>ConnectionFactory</a:t>
             </a:r>
             <a:r>
               <a:rPr lang="pt-BR" dirty="0"/>
               <a:t> </a:t>
             </a:r>
-            <a:r>
-              <a:rPr lang="pt-BR" u="sng" dirty="0"/>
-              <a:t>não garante a imutabilidade</a:t>
+          </a:p>
+          <a:p>
+            <a:pPr marL="0" indent="0">
+              <a:buNone/>
+            </a:pPr>
+            <a:r>
+              <a:rPr lang="pt-BR" dirty="0">
+                <a:solidFill>
+                  <a:srgbClr val="999999"/>
+                </a:solidFill>
+              </a:rPr>
+              <a:t>	.</a:t>
+            </a:r>
+            <a:r>
+              <a:rPr lang="pt-BR" dirty="0" err="1"/>
+              <a:t>getConnection</a:t>
+            </a:r>
+            <a:r>
+              <a:rPr lang="pt-BR" dirty="0">
+                <a:solidFill>
+                  <a:srgbClr val="999999"/>
+                </a:solidFill>
+              </a:rPr>
+              <a:t>()</a:t>
             </a:r>
             <a:r>
               <a:rPr lang="pt-BR" dirty="0"/>
-              <a:t>, apenas a atribuição de um novo valor para a variável. </a:t>
-            </a:r>
-            <a:endParaRPr lang="pt-BR" b="1" dirty="0"/>
+              <a:t> </a:t>
+            </a:r>
+          </a:p>
+          <a:p>
+            <a:pPr marL="457200" lvl="1" indent="0">
+              <a:buNone/>
+            </a:pPr>
+            <a:r>
+              <a:rPr lang="pt-BR" dirty="0">
+                <a:solidFill>
+                  <a:srgbClr val="999999"/>
+                </a:solidFill>
+              </a:rPr>
+              <a:t>	.</a:t>
+            </a:r>
+            <a:r>
+              <a:rPr lang="pt-BR" dirty="0" err="1">
+                <a:solidFill>
+                  <a:srgbClr val="0077AA"/>
+                </a:solidFill>
+              </a:rPr>
+              <a:t>then</a:t>
+            </a:r>
+            <a:r>
+              <a:rPr lang="pt-BR" dirty="0">
+                <a:solidFill>
+                  <a:srgbClr val="999999"/>
+                </a:solidFill>
+              </a:rPr>
+              <a:t>(</a:t>
+            </a:r>
+            <a:r>
+              <a:rPr lang="pt-BR" dirty="0"/>
+              <a:t>connection </a:t>
+            </a:r>
+            <a:r>
+              <a:rPr lang="pt-BR" dirty="0">
+                <a:solidFill>
+                  <a:srgbClr val="999999"/>
+                </a:solidFill>
+              </a:rPr>
+              <a:t>=&gt;</a:t>
+            </a:r>
+            <a:r>
+              <a:rPr lang="pt-BR" dirty="0"/>
+              <a:t> </a:t>
+            </a:r>
+            <a:r>
+              <a:rPr lang="pt-BR" dirty="0">
+                <a:solidFill>
+                  <a:srgbClr val="999999"/>
+                </a:solidFill>
+              </a:rPr>
+              <a:t>{</a:t>
+            </a:r>
+            <a:r>
+              <a:rPr lang="pt-BR" dirty="0"/>
+              <a:t> </a:t>
+            </a:r>
+          </a:p>
+          <a:p>
+            <a:pPr marL="457200" lvl="1" indent="0">
+              <a:buNone/>
+            </a:pPr>
+            <a:r>
+              <a:rPr lang="pt-BR" dirty="0">
+                <a:solidFill>
+                  <a:srgbClr val="999999"/>
+                </a:solidFill>
+              </a:rPr>
+              <a:t>});</a:t>
+            </a:r>
+            <a:r>
+              <a:rPr lang="pt-BR" dirty="0"/>
+              <a:t> </a:t>
+            </a:r>
+          </a:p>
+          <a:p>
+            <a:pPr marL="457200" lvl="1" indent="0">
+              <a:buNone/>
+            </a:pPr>
+            <a:endParaRPr lang="pt-BR" dirty="0">
+              <a:solidFill>
+                <a:srgbClr val="708090"/>
+              </a:solidFill>
+            </a:endParaRPr>
+          </a:p>
+          <a:p>
+            <a:pPr marL="457200" lvl="1" indent="0">
+              <a:buNone/>
+            </a:pPr>
+            <a:r>
+              <a:rPr lang="pt-BR" dirty="0">
+                <a:solidFill>
+                  <a:srgbClr val="708090"/>
+                </a:solidFill>
+              </a:rPr>
+              <a:t>// faz outras coisas e pede novamente a conexão</a:t>
+            </a:r>
+            <a:r>
+              <a:rPr lang="pt-BR" dirty="0"/>
+              <a:t> </a:t>
+            </a:r>
+          </a:p>
+          <a:p>
+            <a:pPr marL="457200" lvl="1" indent="0">
+              <a:buNone/>
+            </a:pPr>
+            <a:endParaRPr lang="pt-BR" sz="2800" dirty="0">
+              <a:solidFill>
+                <a:srgbClr val="A67F59"/>
+              </a:solidFill>
+            </a:endParaRPr>
+          </a:p>
+          <a:p>
+            <a:pPr marL="457200" lvl="1" indent="0">
+              <a:buNone/>
+            </a:pPr>
+            <a:r>
+              <a:rPr lang="pt-BR" sz="2800" dirty="0" err="1">
+                <a:solidFill>
+                  <a:srgbClr val="A67F59"/>
+                </a:solidFill>
+              </a:rPr>
+              <a:t>ConnectionFactory</a:t>
+            </a:r>
+            <a:r>
+              <a:rPr lang="pt-BR" sz="2800" dirty="0"/>
+              <a:t> </a:t>
+            </a:r>
+          </a:p>
+          <a:p>
+            <a:pPr marL="457200" lvl="1" indent="0">
+              <a:buNone/>
+            </a:pPr>
+            <a:r>
+              <a:rPr lang="pt-BR" sz="2800" dirty="0">
+                <a:solidFill>
+                  <a:srgbClr val="999999"/>
+                </a:solidFill>
+              </a:rPr>
+              <a:t>	.</a:t>
+            </a:r>
+            <a:r>
+              <a:rPr lang="pt-BR" sz="2800" dirty="0" err="1"/>
+              <a:t>getConnection</a:t>
+            </a:r>
+            <a:r>
+              <a:rPr lang="pt-BR" sz="2800" dirty="0">
+                <a:solidFill>
+                  <a:srgbClr val="999999"/>
+                </a:solidFill>
+              </a:rPr>
+              <a:t>()</a:t>
+            </a:r>
+            <a:r>
+              <a:rPr lang="pt-BR" sz="2800" dirty="0"/>
+              <a:t> </a:t>
+            </a:r>
+          </a:p>
+          <a:p>
+            <a:pPr marL="457200" lvl="1" indent="0">
+              <a:buNone/>
+            </a:pPr>
+            <a:r>
+              <a:rPr lang="pt-BR" sz="2800" dirty="0">
+                <a:solidFill>
+                  <a:srgbClr val="999999"/>
+                </a:solidFill>
+              </a:rPr>
+              <a:t>	.</a:t>
+            </a:r>
+            <a:r>
+              <a:rPr lang="pt-BR" sz="2800" dirty="0" err="1">
+                <a:solidFill>
+                  <a:srgbClr val="0077AA"/>
+                </a:solidFill>
+              </a:rPr>
+              <a:t>then</a:t>
+            </a:r>
+            <a:r>
+              <a:rPr lang="pt-BR" sz="2800" dirty="0">
+                <a:solidFill>
+                  <a:srgbClr val="999999"/>
+                </a:solidFill>
+              </a:rPr>
+              <a:t>(</a:t>
+            </a:r>
+            <a:r>
+              <a:rPr lang="pt-BR" sz="2800" dirty="0"/>
+              <a:t>connection </a:t>
+            </a:r>
+            <a:r>
+              <a:rPr lang="pt-BR" sz="2800" dirty="0">
+                <a:solidFill>
+                  <a:srgbClr val="999999"/>
+                </a:solidFill>
+              </a:rPr>
+              <a:t>=&gt;</a:t>
+            </a:r>
+            <a:r>
+              <a:rPr lang="pt-BR" sz="2800" dirty="0"/>
+              <a:t> </a:t>
+            </a:r>
+            <a:r>
+              <a:rPr lang="pt-BR" sz="2800" dirty="0">
+                <a:solidFill>
+                  <a:srgbClr val="999999"/>
+                </a:solidFill>
+              </a:rPr>
+              <a:t>{</a:t>
+            </a:r>
+            <a:r>
+              <a:rPr lang="pt-BR" sz="2800" dirty="0"/>
+              <a:t> </a:t>
+            </a:r>
+          </a:p>
+          <a:p>
+            <a:pPr marL="457200" lvl="1" indent="0">
+              <a:buNone/>
+            </a:pPr>
+            <a:r>
+              <a:rPr lang="pt-BR" sz="2800" dirty="0">
+                <a:solidFill>
+                  <a:srgbClr val="999999"/>
+                </a:solidFill>
+              </a:rPr>
+              <a:t>});</a:t>
+            </a:r>
+            <a:endParaRPr lang="pt-BR" sz="2800" dirty="0">
+              <a:solidFill>
+                <a:schemeClr val="accent5"/>
+              </a:solidFill>
+            </a:endParaRPr>
           </a:p>
         </p:txBody>
       </p:sp>
     </p:spTree>
     <p:extLst>
       <p:ext uri="{BB962C8B-B14F-4D97-AF65-F5344CB8AC3E}">
-        <p14:creationId xmlns:p14="http://schemas.microsoft.com/office/powerpoint/2010/main" val="3568488777"/>
+        <p14:creationId xmlns:p14="http://schemas.microsoft.com/office/powerpoint/2010/main" val="1564479947"/>
       </p:ext>
     </p:extLst>
   </p:cSld>

</xml_diff>

<commit_message>
Ponto intermediário. Resolver problemas. Projeto com erro de execução
</commit_message>
<xml_diff>
--- a/docs/Webpack-resumo.pptx
+++ b/docs/Webpack-resumo.pptx
@@ -14,8 +14,9 @@
     <p:sldId id="286" r:id="rId8"/>
     <p:sldId id="288" r:id="rId9"/>
     <p:sldId id="289" r:id="rId10"/>
-    <p:sldId id="277" r:id="rId11"/>
-    <p:sldId id="278" r:id="rId12"/>
+    <p:sldId id="290" r:id="rId11"/>
+    <p:sldId id="277" r:id="rId12"/>
+    <p:sldId id="278" r:id="rId13"/>
   </p:sldIdLst>
   <p:sldSz cx="12192000" cy="6858000"/>
   <p:notesSz cx="6858000" cy="9144000"/>
@@ -251,7 +252,7 @@
           <a:p>
             <a:fld id="{CC58B075-67F8-4A8D-AE1C-3D3E4193EBCA}" type="datetimeFigureOut">
               <a:rPr lang="pt-BR" smtClean="0"/>
-              <a:t>07/06/2019</a:t>
+              <a:t>14/06/2019</a:t>
             </a:fld>
             <a:endParaRPr lang="pt-BR"/>
           </a:p>
@@ -419,7 +420,7 @@
           <a:p>
             <a:fld id="{CC58B075-67F8-4A8D-AE1C-3D3E4193EBCA}" type="datetimeFigureOut">
               <a:rPr lang="pt-BR" smtClean="0"/>
-              <a:t>07/06/2019</a:t>
+              <a:t>14/06/2019</a:t>
             </a:fld>
             <a:endParaRPr lang="pt-BR"/>
           </a:p>
@@ -597,7 +598,7 @@
           <a:p>
             <a:fld id="{CC58B075-67F8-4A8D-AE1C-3D3E4193EBCA}" type="datetimeFigureOut">
               <a:rPr lang="pt-BR" smtClean="0"/>
-              <a:t>07/06/2019</a:t>
+              <a:t>14/06/2019</a:t>
             </a:fld>
             <a:endParaRPr lang="pt-BR"/>
           </a:p>
@@ -765,7 +766,7 @@
           <a:p>
             <a:fld id="{CC58B075-67F8-4A8D-AE1C-3D3E4193EBCA}" type="datetimeFigureOut">
               <a:rPr lang="pt-BR" smtClean="0"/>
-              <a:t>07/06/2019</a:t>
+              <a:t>14/06/2019</a:t>
             </a:fld>
             <a:endParaRPr lang="pt-BR"/>
           </a:p>
@@ -1010,7 +1011,7 @@
           <a:p>
             <a:fld id="{CC58B075-67F8-4A8D-AE1C-3D3E4193EBCA}" type="datetimeFigureOut">
               <a:rPr lang="pt-BR" smtClean="0"/>
-              <a:t>07/06/2019</a:t>
+              <a:t>14/06/2019</a:t>
             </a:fld>
             <a:endParaRPr lang="pt-BR"/>
           </a:p>
@@ -1239,7 +1240,7 @@
           <a:p>
             <a:fld id="{CC58B075-67F8-4A8D-AE1C-3D3E4193EBCA}" type="datetimeFigureOut">
               <a:rPr lang="pt-BR" smtClean="0"/>
-              <a:t>07/06/2019</a:t>
+              <a:t>14/06/2019</a:t>
             </a:fld>
             <a:endParaRPr lang="pt-BR"/>
           </a:p>
@@ -1603,7 +1604,7 @@
           <a:p>
             <a:fld id="{CC58B075-67F8-4A8D-AE1C-3D3E4193EBCA}" type="datetimeFigureOut">
               <a:rPr lang="pt-BR" smtClean="0"/>
-              <a:t>07/06/2019</a:t>
+              <a:t>14/06/2019</a:t>
             </a:fld>
             <a:endParaRPr lang="pt-BR"/>
           </a:p>
@@ -1720,7 +1721,7 @@
           <a:p>
             <a:fld id="{CC58B075-67F8-4A8D-AE1C-3D3E4193EBCA}" type="datetimeFigureOut">
               <a:rPr lang="pt-BR" smtClean="0"/>
-              <a:t>07/06/2019</a:t>
+              <a:t>14/06/2019</a:t>
             </a:fld>
             <a:endParaRPr lang="pt-BR"/>
           </a:p>
@@ -1815,7 +1816,7 @@
           <a:p>
             <a:fld id="{CC58B075-67F8-4A8D-AE1C-3D3E4193EBCA}" type="datetimeFigureOut">
               <a:rPr lang="pt-BR" smtClean="0"/>
-              <a:t>07/06/2019</a:t>
+              <a:t>14/06/2019</a:t>
             </a:fld>
             <a:endParaRPr lang="pt-BR"/>
           </a:p>
@@ -2090,7 +2091,7 @@
           <a:p>
             <a:fld id="{CC58B075-67F8-4A8D-AE1C-3D3E4193EBCA}" type="datetimeFigureOut">
               <a:rPr lang="pt-BR" smtClean="0"/>
-              <a:t>07/06/2019</a:t>
+              <a:t>14/06/2019</a:t>
             </a:fld>
             <a:endParaRPr lang="pt-BR"/>
           </a:p>
@@ -2342,7 +2343,7 @@
           <a:p>
             <a:fld id="{CC58B075-67F8-4A8D-AE1C-3D3E4193EBCA}" type="datetimeFigureOut">
               <a:rPr lang="pt-BR" smtClean="0"/>
-              <a:t>07/06/2019</a:t>
+              <a:t>14/06/2019</a:t>
             </a:fld>
             <a:endParaRPr lang="pt-BR"/>
           </a:p>
@@ -2553,7 +2554,7 @@
           <a:p>
             <a:fld id="{CC58B075-67F8-4A8D-AE1C-3D3E4193EBCA}" type="datetimeFigureOut">
               <a:rPr lang="pt-BR" smtClean="0"/>
-              <a:t>07/06/2019</a:t>
+              <a:t>14/06/2019</a:t>
             </a:fld>
             <a:endParaRPr lang="pt-BR"/>
           </a:p>
@@ -3023,6 +3024,202 @@
             <p:ph type="title"/>
           </p:nvPr>
         </p:nvSpPr>
+        <p:spPr>
+          <a:xfrm>
+            <a:off x="759177" y="89552"/>
+            <a:ext cx="10515600" cy="549275"/>
+          </a:xfrm>
+        </p:spPr>
+        <p:txBody>
+          <a:bodyPr>
+            <a:normAutofit/>
+          </a:bodyPr>
+          <a:lstStyle/>
+          <a:p>
+            <a:pPr algn="ctr"/>
+            <a:r>
+              <a:rPr lang="pt-BR" sz="2800" b="1" dirty="0" smtClean="0"/>
+              <a:t>Gerando a página principal automaticamente</a:t>
+            </a:r>
+            <a:endParaRPr lang="pt-BR" sz="2800" b="1" dirty="0"/>
+          </a:p>
+        </p:txBody>
+      </p:sp>
+      <p:sp>
+        <p:nvSpPr>
+          <p:cNvPr id="7" name="Espaço Reservado para Conteúdo 6">
+            <a:extLst>
+              <a:ext uri="{FF2B5EF4-FFF2-40B4-BE49-F238E27FC236}">
+                <a16:creationId xmlns:a16="http://schemas.microsoft.com/office/drawing/2014/main" id="{CBDD146F-E87E-0140-B521-E123E7DC95E8}"/>
+              </a:ext>
+            </a:extLst>
+          </p:cNvPr>
+          <p:cNvSpPr>
+            <a:spLocks noGrp="1"/>
+          </p:cNvSpPr>
+          <p:nvPr>
+            <p:ph idx="1"/>
+          </p:nvPr>
+        </p:nvSpPr>
+        <p:spPr>
+          <a:xfrm>
+            <a:off x="484648" y="941366"/>
+            <a:ext cx="10790129" cy="5375297"/>
+          </a:xfrm>
+        </p:spPr>
+        <p:txBody>
+          <a:bodyPr>
+            <a:normAutofit/>
+          </a:bodyPr>
+          <a:lstStyle/>
+          <a:p>
+            <a:r>
+              <a:rPr lang="pt-BR" sz="2000" dirty="0" smtClean="0"/>
+              <a:t>Utilizar o </a:t>
+            </a:r>
+            <a:r>
+              <a:rPr lang="pt-BR" sz="2000" dirty="0" err="1" smtClean="0"/>
+              <a:t>plugin</a:t>
+            </a:r>
+            <a:r>
+              <a:rPr lang="pt-BR" sz="2000" dirty="0" smtClean="0"/>
+              <a:t> </a:t>
+            </a:r>
+            <a:r>
+              <a:rPr lang="pt-BR" sz="2000" b="1" dirty="0" err="1" smtClean="0"/>
+              <a:t>html-webpack-plugin</a:t>
+            </a:r>
+            <a:endParaRPr lang="pt-BR" sz="2000" b="1" dirty="0" smtClean="0"/>
+          </a:p>
+          <a:p>
+            <a:endParaRPr lang="pt-BR" sz="2000" b="1" dirty="0" smtClean="0"/>
+          </a:p>
+          <a:p>
+            <a:r>
+              <a:rPr lang="pt-BR" sz="2000" dirty="0" smtClean="0"/>
+              <a:t>Para evitarmos </a:t>
+            </a:r>
+            <a:r>
+              <a:rPr lang="pt-BR" sz="2000" dirty="0"/>
+              <a:t>o problema de fazer múltiplas requisições para fazermos o download de vários arquivos. Mas, agora, gastamos um bom tempo para baixar o bundle.js e para só então, ele será processado pela aplicação.</a:t>
+            </a:r>
+          </a:p>
+          <a:p>
+            <a:endParaRPr lang="pt-BR" sz="2000" dirty="0"/>
+          </a:p>
+          <a:p>
+            <a:r>
+              <a:rPr lang="pt-BR" sz="2000" dirty="0"/>
+              <a:t>Um estratégia utilizada para a resolução de problemas como esse é o </a:t>
+            </a:r>
+            <a:r>
+              <a:rPr lang="pt-BR" sz="2000" b="1" dirty="0" err="1" smtClean="0"/>
+              <a:t>code</a:t>
+            </a:r>
+            <a:r>
+              <a:rPr lang="pt-BR" sz="2000" b="1" dirty="0" smtClean="0"/>
+              <a:t> </a:t>
+            </a:r>
+            <a:r>
+              <a:rPr lang="pt-BR" sz="2000" b="1" dirty="0" err="1" smtClean="0"/>
+              <a:t>splitting</a:t>
+            </a:r>
+            <a:r>
+              <a:rPr lang="pt-BR" sz="2000" b="1" dirty="0" smtClean="0"/>
+              <a:t> </a:t>
+            </a:r>
+            <a:r>
+              <a:rPr lang="pt-BR" sz="2000" dirty="0" smtClean="0"/>
+              <a:t>(</a:t>
+            </a:r>
+            <a:r>
+              <a:rPr lang="pt-BR" sz="2000" dirty="0"/>
+              <a:t>separação de código) e o </a:t>
+            </a:r>
+            <a:r>
+              <a:rPr lang="pt-BR" sz="2000" b="1" dirty="0" err="1"/>
+              <a:t>lazy</a:t>
+            </a:r>
+            <a:r>
+              <a:rPr lang="pt-BR" sz="2000" b="1" dirty="0"/>
+              <a:t> </a:t>
+            </a:r>
+            <a:r>
+              <a:rPr lang="pt-BR" sz="2000" b="1" dirty="0" err="1"/>
+              <a:t>loading</a:t>
+            </a:r>
+            <a:r>
+              <a:rPr lang="pt-BR" sz="2000" b="1" dirty="0"/>
+              <a:t> </a:t>
+            </a:r>
+            <a:r>
+              <a:rPr lang="pt-BR" sz="2000" dirty="0"/>
+              <a:t>(carregamento preguiçoso). Em aplicação como </a:t>
+            </a:r>
+            <a:r>
+              <a:rPr lang="pt-BR" sz="2000" dirty="0" err="1" smtClean="0"/>
+              <a:t>AngularJS</a:t>
+            </a:r>
+            <a:r>
+              <a:rPr lang="pt-BR" sz="2000" dirty="0" smtClean="0"/>
+              <a:t> </a:t>
+            </a:r>
+            <a:r>
+              <a:rPr lang="pt-BR" sz="2000" dirty="0"/>
+              <a:t>ou </a:t>
+            </a:r>
+            <a:r>
+              <a:rPr lang="pt-BR" sz="2000" dirty="0" err="1"/>
+              <a:t>VueJS</a:t>
+            </a:r>
+            <a:r>
+              <a:rPr lang="pt-BR" sz="2000" dirty="0"/>
+              <a:t>, em seus sistemas de rotas, podemos informar que queremos carregar um módulo no momento em que for necessário. </a:t>
+            </a:r>
+            <a:endParaRPr lang="pt-BR" sz="2000" dirty="0"/>
+          </a:p>
+        </p:txBody>
+      </p:sp>
+    </p:spTree>
+    <p:extLst>
+      <p:ext uri="{BB962C8B-B14F-4D97-AF65-F5344CB8AC3E}">
+        <p14:creationId xmlns:p14="http://schemas.microsoft.com/office/powerpoint/2010/main" val="3262670947"/>
+      </p:ext>
+    </p:extLst>
+  </p:cSld>
+  <p:clrMapOvr>
+    <a:masterClrMapping/>
+  </p:clrMapOvr>
+</p:sld>
+</file>
+
+<file path=ppt/slides/slide11.xml><?xml version="1.0" encoding="utf-8"?>
+<p:sld xmlns:a="http://schemas.openxmlformats.org/drawingml/2006/main" xmlns:r="http://schemas.openxmlformats.org/officeDocument/2006/relationships" xmlns:p="http://schemas.openxmlformats.org/presentationml/2006/main">
+  <p:cSld>
+    <p:spTree>
+      <p:nvGrpSpPr>
+        <p:cNvPr id="1" name=""/>
+        <p:cNvGrpSpPr/>
+        <p:nvPr/>
+      </p:nvGrpSpPr>
+      <p:grpSpPr>
+        <a:xfrm>
+          <a:off x="0" y="0"/>
+          <a:ext cx="0" cy="0"/>
+          <a:chOff x="0" y="0"/>
+          <a:chExt cx="0" cy="0"/>
+        </a:xfrm>
+      </p:grpSpPr>
+      <p:sp>
+        <p:nvSpPr>
+          <p:cNvPr id="2" name="Título 1"/>
+          <p:cNvSpPr>
+            <a:spLocks noGrp="1"/>
+          </p:cNvSpPr>
+          <p:nvPr>
+            <p:ph type="title"/>
+          </p:nvPr>
+        </p:nvSpPr>
         <p:spPr/>
         <p:txBody>
           <a:bodyPr/>
@@ -3064,7 +3261,7 @@
 </p:sld>
 </file>
 
-<file path=ppt/slides/slide11.xml><?xml version="1.0" encoding="utf-8"?>
+<file path=ppt/slides/slide12.xml><?xml version="1.0" encoding="utf-8"?>
 <p:sld xmlns:a="http://schemas.openxmlformats.org/drawingml/2006/main" xmlns:r="http://schemas.openxmlformats.org/officeDocument/2006/relationships" xmlns:p="http://schemas.openxmlformats.org/presentationml/2006/main">
   <p:cSld>
     <p:spTree>
@@ -5347,11 +5544,7 @@
             <a:pPr algn="ctr"/>
             <a:r>
               <a:rPr lang="pt-BR" sz="2800" b="1" dirty="0" smtClean="0"/>
-              <a:t>Manipulando </a:t>
-            </a:r>
-            <a:r>
-              <a:rPr lang="pt-BR" sz="2800" b="1" dirty="0" smtClean="0"/>
-              <a:t>módulos JS</a:t>
+              <a:t>Manipulando módulos JS</a:t>
             </a:r>
             <a:endParaRPr lang="pt-BR" sz="2800" b="1" dirty="0"/>
           </a:p>
@@ -5556,7 +5749,6 @@
               <a:rPr lang="pt-BR" sz="2400" dirty="0"/>
               <a:t> que não permite que escape para o escopo global.</a:t>
             </a:r>
-            <a:endParaRPr lang="pt-BR" sz="2400" dirty="0"/>
           </a:p>
         </p:txBody>
       </p:sp>
@@ -5615,11 +5807,7 @@
             <a:pPr algn="ctr"/>
             <a:r>
               <a:rPr lang="pt-BR" sz="2800" b="1" dirty="0" smtClean="0"/>
-              <a:t>Manipulando </a:t>
-            </a:r>
-            <a:r>
-              <a:rPr lang="pt-BR" sz="2800" b="1" dirty="0" smtClean="0"/>
-              <a:t>módulos JS</a:t>
+              <a:t>Manipulando módulos JS</a:t>
             </a:r>
             <a:endParaRPr lang="pt-BR" sz="2800" b="1" dirty="0"/>
           </a:p>
@@ -5823,7 +6011,6 @@
               <a:rPr lang="pt-BR" sz="2400" dirty="0"/>
               <a:t>que dependem dele.</a:t>
             </a:r>
-            <a:endParaRPr lang="pt-BR" sz="2400" dirty="0"/>
           </a:p>
         </p:txBody>
       </p:sp>

</xml_diff>

<commit_message>
Projeto finalizado e funcionando perfeitamente
</commit_message>
<xml_diff>
--- a/docs/Webpack-resumo.pptx
+++ b/docs/Webpack-resumo.pptx
@@ -17,6 +17,8 @@
     <p:sldId id="290" r:id="rId11"/>
     <p:sldId id="277" r:id="rId12"/>
     <p:sldId id="278" r:id="rId13"/>
+    <p:sldId id="293" r:id="rId14"/>
+    <p:sldId id="291" r:id="rId15"/>
   </p:sldIdLst>
   <p:sldSz cx="12192000" cy="6858000"/>
   <p:notesSz cx="6858000" cy="9144000"/>
@@ -252,7 +254,7 @@
           <a:p>
             <a:fld id="{CC58B075-67F8-4A8D-AE1C-3D3E4193EBCA}" type="datetimeFigureOut">
               <a:rPr lang="pt-BR" smtClean="0"/>
-              <a:t>14/06/2019</a:t>
+              <a:t>16/06/19</a:t>
             </a:fld>
             <a:endParaRPr lang="pt-BR"/>
           </a:p>
@@ -420,7 +422,7 @@
           <a:p>
             <a:fld id="{CC58B075-67F8-4A8D-AE1C-3D3E4193EBCA}" type="datetimeFigureOut">
               <a:rPr lang="pt-BR" smtClean="0"/>
-              <a:t>14/06/2019</a:t>
+              <a:t>16/06/19</a:t>
             </a:fld>
             <a:endParaRPr lang="pt-BR"/>
           </a:p>
@@ -598,7 +600,7 @@
           <a:p>
             <a:fld id="{CC58B075-67F8-4A8D-AE1C-3D3E4193EBCA}" type="datetimeFigureOut">
               <a:rPr lang="pt-BR" smtClean="0"/>
-              <a:t>14/06/2019</a:t>
+              <a:t>16/06/19</a:t>
             </a:fld>
             <a:endParaRPr lang="pt-BR"/>
           </a:p>
@@ -766,7 +768,7 @@
           <a:p>
             <a:fld id="{CC58B075-67F8-4A8D-AE1C-3D3E4193EBCA}" type="datetimeFigureOut">
               <a:rPr lang="pt-BR" smtClean="0"/>
-              <a:t>14/06/2019</a:t>
+              <a:t>16/06/19</a:t>
             </a:fld>
             <a:endParaRPr lang="pt-BR"/>
           </a:p>
@@ -1011,7 +1013,7 @@
           <a:p>
             <a:fld id="{CC58B075-67F8-4A8D-AE1C-3D3E4193EBCA}" type="datetimeFigureOut">
               <a:rPr lang="pt-BR" smtClean="0"/>
-              <a:t>14/06/2019</a:t>
+              <a:t>16/06/19</a:t>
             </a:fld>
             <a:endParaRPr lang="pt-BR"/>
           </a:p>
@@ -1240,7 +1242,7 @@
           <a:p>
             <a:fld id="{CC58B075-67F8-4A8D-AE1C-3D3E4193EBCA}" type="datetimeFigureOut">
               <a:rPr lang="pt-BR" smtClean="0"/>
-              <a:t>14/06/2019</a:t>
+              <a:t>16/06/19</a:t>
             </a:fld>
             <a:endParaRPr lang="pt-BR"/>
           </a:p>
@@ -1604,7 +1606,7 @@
           <a:p>
             <a:fld id="{CC58B075-67F8-4A8D-AE1C-3D3E4193EBCA}" type="datetimeFigureOut">
               <a:rPr lang="pt-BR" smtClean="0"/>
-              <a:t>14/06/2019</a:t>
+              <a:t>16/06/19</a:t>
             </a:fld>
             <a:endParaRPr lang="pt-BR"/>
           </a:p>
@@ -1721,7 +1723,7 @@
           <a:p>
             <a:fld id="{CC58B075-67F8-4A8D-AE1C-3D3E4193EBCA}" type="datetimeFigureOut">
               <a:rPr lang="pt-BR" smtClean="0"/>
-              <a:t>14/06/2019</a:t>
+              <a:t>16/06/19</a:t>
             </a:fld>
             <a:endParaRPr lang="pt-BR"/>
           </a:p>
@@ -1816,7 +1818,7 @@
           <a:p>
             <a:fld id="{CC58B075-67F8-4A8D-AE1C-3D3E4193EBCA}" type="datetimeFigureOut">
               <a:rPr lang="pt-BR" smtClean="0"/>
-              <a:t>14/06/2019</a:t>
+              <a:t>16/06/19</a:t>
             </a:fld>
             <a:endParaRPr lang="pt-BR"/>
           </a:p>
@@ -2091,7 +2093,7 @@
           <a:p>
             <a:fld id="{CC58B075-67F8-4A8D-AE1C-3D3E4193EBCA}" type="datetimeFigureOut">
               <a:rPr lang="pt-BR" smtClean="0"/>
-              <a:t>14/06/2019</a:t>
+              <a:t>16/06/19</a:t>
             </a:fld>
             <a:endParaRPr lang="pt-BR"/>
           </a:p>
@@ -2343,7 +2345,7 @@
           <a:p>
             <a:fld id="{CC58B075-67F8-4A8D-AE1C-3D3E4193EBCA}" type="datetimeFigureOut">
               <a:rPr lang="pt-BR" smtClean="0"/>
-              <a:t>14/06/2019</a:t>
+              <a:t>16/06/19</a:t>
             </a:fld>
             <a:endParaRPr lang="pt-BR"/>
           </a:p>
@@ -2554,7 +2556,7 @@
           <a:p>
             <a:fld id="{CC58B075-67F8-4A8D-AE1C-3D3E4193EBCA}" type="datetimeFigureOut">
               <a:rPr lang="pt-BR" smtClean="0"/>
-              <a:t>14/06/2019</a:t>
+              <a:t>16/06/19</a:t>
             </a:fld>
             <a:endParaRPr lang="pt-BR"/>
           </a:p>
@@ -2977,7 +2979,7 @@
           <a:lstStyle/>
           <a:p>
             <a:r>
-              <a:rPr lang="pt-BR" sz="3600" dirty="0" err="1" smtClean="0"/>
+              <a:rPr lang="pt-BR" sz="3600" dirty="0" err="1"/>
               <a:t>Webpack</a:t>
             </a:r>
             <a:endParaRPr lang="pt-BR" sz="3600" dirty="0"/>
@@ -3038,10 +3040,9 @@
           <a:p>
             <a:pPr algn="ctr"/>
             <a:r>
-              <a:rPr lang="pt-BR" sz="2800" b="1" dirty="0" smtClean="0"/>
+              <a:rPr lang="pt-BR" sz="2800" b="1" dirty="0"/>
               <a:t>Gerando a página principal automaticamente</a:t>
             </a:r>
-            <a:endParaRPr lang="pt-BR" sz="2800" b="1" dirty="0"/>
           </a:p>
         </p:txBody>
       </p:sp>
@@ -3074,34 +3075,30 @@
           <a:lstStyle/>
           <a:p>
             <a:r>
-              <a:rPr lang="pt-BR" sz="2000" dirty="0" smtClean="0"/>
+              <a:rPr lang="pt-BR" sz="2000" dirty="0"/>
               <a:t>Utilizar o </a:t>
             </a:r>
             <a:r>
-              <a:rPr lang="pt-BR" sz="2000" dirty="0" err="1" smtClean="0"/>
+              <a:rPr lang="pt-BR" sz="2000" dirty="0" err="1"/>
               <a:t>plugin</a:t>
             </a:r>
             <a:r>
-              <a:rPr lang="pt-BR" sz="2000" dirty="0" smtClean="0"/>
+              <a:rPr lang="pt-BR" sz="2000" dirty="0"/>
               <a:t> </a:t>
             </a:r>
             <a:r>
-              <a:rPr lang="pt-BR" sz="2000" b="1" dirty="0" err="1" smtClean="0"/>
+              <a:rPr lang="pt-BR" sz="2000" b="1" dirty="0" err="1"/>
               <a:t>html-webpack-plugin</a:t>
             </a:r>
-            <a:endParaRPr lang="pt-BR" sz="2000" b="1" dirty="0" smtClean="0"/>
-          </a:p>
-          <a:p>
-            <a:endParaRPr lang="pt-BR" sz="2000" b="1" dirty="0" smtClean="0"/>
-          </a:p>
-          <a:p>
-            <a:r>
-              <a:rPr lang="pt-BR" sz="2000" dirty="0" smtClean="0"/>
-              <a:t>Para evitarmos </a:t>
-            </a:r>
+            <a:endParaRPr lang="pt-BR" sz="2000" b="1" dirty="0"/>
+          </a:p>
+          <a:p>
+            <a:endParaRPr lang="pt-BR" sz="2000" b="1" dirty="0"/>
+          </a:p>
+          <a:p>
             <a:r>
               <a:rPr lang="pt-BR" sz="2000" dirty="0"/>
-              <a:t>o problema de fazer múltiplas requisições para fazermos o download de vários arquivos. Mas, agora, gastamos um bom tempo para baixar o bundle.js e para só então, ele será processado pela aplicação.</a:t>
+              <a:t>Para evitarmos o problema de fazer múltiplas requisições para fazermos o download de vários arquivos. Mas, agora, gastamos um bom tempo para baixar o bundle.js e para só então, ele será processado pela aplicação.</a:t>
             </a:r>
           </a:p>
           <a:p>
@@ -3113,28 +3110,24 @@
               <a:t>Um estratégia utilizada para a resolução de problemas como esse é o </a:t>
             </a:r>
             <a:r>
-              <a:rPr lang="pt-BR" sz="2000" b="1" dirty="0" err="1" smtClean="0"/>
+              <a:rPr lang="pt-BR" sz="2000" b="1" dirty="0" err="1"/>
               <a:t>code</a:t>
             </a:r>
             <a:r>
-              <a:rPr lang="pt-BR" sz="2000" b="1" dirty="0" smtClean="0"/>
+              <a:rPr lang="pt-BR" sz="2000" b="1" dirty="0"/>
               <a:t> </a:t>
             </a:r>
             <a:r>
-              <a:rPr lang="pt-BR" sz="2000" b="1" dirty="0" err="1" smtClean="0"/>
+              <a:rPr lang="pt-BR" sz="2000" b="1" dirty="0" err="1"/>
               <a:t>splitting</a:t>
             </a:r>
             <a:r>
-              <a:rPr lang="pt-BR" sz="2000" b="1" dirty="0" smtClean="0"/>
+              <a:rPr lang="pt-BR" sz="2000" b="1" dirty="0"/>
               <a:t> </a:t>
             </a:r>
             <a:r>
-              <a:rPr lang="pt-BR" sz="2000" dirty="0" smtClean="0"/>
-              <a:t>(</a:t>
-            </a:r>
-            <a:r>
               <a:rPr lang="pt-BR" sz="2000" dirty="0"/>
-              <a:t>separação de código) e o </a:t>
+              <a:t>(separação de código) e o </a:t>
             </a:r>
             <a:r>
               <a:rPr lang="pt-BR" sz="2000" b="1" dirty="0" err="1"/>
@@ -3157,16 +3150,12 @@
               <a:t>(carregamento preguiçoso). Em aplicação como </a:t>
             </a:r>
             <a:r>
-              <a:rPr lang="pt-BR" sz="2000" dirty="0" err="1" smtClean="0"/>
+              <a:rPr lang="pt-BR" sz="2000" dirty="0" err="1"/>
               <a:t>AngularJS</a:t>
             </a:r>
             <a:r>
-              <a:rPr lang="pt-BR" sz="2000" dirty="0" smtClean="0"/>
-              <a:t> </a:t>
-            </a:r>
-            <a:r>
               <a:rPr lang="pt-BR" sz="2000" dirty="0"/>
-              <a:t>ou </a:t>
+              <a:t> ou </a:t>
             </a:r>
             <a:r>
               <a:rPr lang="pt-BR" sz="2000" dirty="0" err="1"/>
@@ -3176,7 +3165,6 @@
               <a:rPr lang="pt-BR" sz="2000" dirty="0"/>
               <a:t>, em seus sistemas de rotas, podemos informar que queremos carregar um módulo no momento em que for necessário. </a:t>
             </a:r>
-            <a:endParaRPr lang="pt-BR" sz="2000" dirty="0"/>
           </a:p>
         </p:txBody>
       </p:sp>
@@ -3220,12 +3208,48 @@
             <p:ph type="title"/>
           </p:nvPr>
         </p:nvSpPr>
-        <p:spPr/>
-        <p:txBody>
-          <a:bodyPr/>
-          <a:lstStyle/>
-          <a:p>
-            <a:endParaRPr lang="pt-BR"/>
+        <p:spPr>
+          <a:xfrm>
+            <a:off x="838200" y="149225"/>
+            <a:ext cx="10515600" cy="854075"/>
+          </a:xfrm>
+        </p:spPr>
+        <p:txBody>
+          <a:bodyPr>
+            <a:normAutofit/>
+          </a:bodyPr>
+          <a:lstStyle/>
+          <a:p>
+            <a:pPr algn="ctr"/>
+            <a:r>
+              <a:rPr lang="pt-BR" sz="3600" b="1" dirty="0" err="1"/>
+              <a:t>Code</a:t>
+            </a:r>
+            <a:r>
+              <a:rPr lang="pt-BR" sz="3600" b="1" dirty="0"/>
+              <a:t> </a:t>
+            </a:r>
+            <a:r>
+              <a:rPr lang="pt-BR" sz="3600" b="1" dirty="0" err="1"/>
+              <a:t>spliting</a:t>
+            </a:r>
+            <a:r>
+              <a:rPr lang="pt-BR" sz="3600" b="1" dirty="0"/>
+              <a:t> e </a:t>
+            </a:r>
+            <a:r>
+              <a:rPr lang="pt-BR" sz="3600" b="1" dirty="0" err="1"/>
+              <a:t>Lazy</a:t>
+            </a:r>
+            <a:r>
+              <a:rPr lang="pt-BR" sz="3600" b="1" dirty="0"/>
+              <a:t> </a:t>
+            </a:r>
+            <a:r>
+              <a:rPr lang="pt-BR" sz="3600" b="1" dirty="0" err="1"/>
+              <a:t>loading</a:t>
+            </a:r>
+            <a:endParaRPr lang="pt-BR" sz="3600" b="1" dirty="0"/>
           </a:p>
         </p:txBody>
       </p:sp>
@@ -3239,12 +3263,136 @@
             <p:ph idx="1"/>
           </p:nvPr>
         </p:nvSpPr>
-        <p:spPr/>
-        <p:txBody>
-          <a:bodyPr/>
-          <a:lstStyle/>
-          <a:p>
-            <a:endParaRPr lang="pt-BR"/>
+        <p:spPr>
+          <a:xfrm>
+            <a:off x="508000" y="1216024"/>
+            <a:ext cx="11252200" cy="5057775"/>
+          </a:xfrm>
+        </p:spPr>
+        <p:txBody>
+          <a:bodyPr>
+            <a:normAutofit fontScale="92500" lnSpcReduction="20000"/>
+          </a:bodyPr>
+          <a:lstStyle/>
+          <a:p>
+            <a:pPr marL="0" indent="0">
+              <a:buNone/>
+            </a:pPr>
+            <a:r>
+              <a:rPr lang="pt-BR" dirty="0"/>
+              <a:t>Podemos usar </a:t>
+            </a:r>
+            <a:r>
+              <a:rPr lang="pt-BR" dirty="0" err="1"/>
+              <a:t>System.import</a:t>
+            </a:r>
+            <a:r>
+              <a:rPr lang="pt-BR" dirty="0"/>
+              <a:t> ou import. A último forma é que se tornará vigente e que se coaduna com a </a:t>
+            </a:r>
+            <a:r>
+              <a:rPr lang="pt-BR" dirty="0" err="1"/>
+              <a:t>spec</a:t>
+            </a:r>
+            <a:r>
+              <a:rPr lang="pt-BR" dirty="0"/>
+              <a:t> </a:t>
+            </a:r>
+            <a:r>
+              <a:rPr lang="pt-BR" dirty="0" err="1"/>
+              <a:t>import</a:t>
+            </a:r>
+            <a:r>
+              <a:rPr lang="pt-BR" dirty="0"/>
+              <a:t> do ECMASCRIPT.</a:t>
+            </a:r>
+          </a:p>
+          <a:p>
+            <a:pPr marL="0" indent="0">
+              <a:buNone/>
+            </a:pPr>
+            <a:endParaRPr lang="pt-BR" dirty="0"/>
+          </a:p>
+          <a:p>
+            <a:pPr marL="0" indent="0">
+              <a:buNone/>
+            </a:pPr>
+            <a:r>
+              <a:rPr lang="pt-BR" dirty="0"/>
+              <a:t>Correto. Podemos usar as duas formas. </a:t>
+            </a:r>
+            <a:r>
+              <a:rPr lang="pt-BR" dirty="0" err="1"/>
+              <a:t>Webpack</a:t>
+            </a:r>
+            <a:r>
+              <a:rPr lang="pt-BR" dirty="0"/>
+              <a:t> mantém </a:t>
+            </a:r>
+            <a:r>
+              <a:rPr lang="pt-BR" dirty="0" err="1"/>
+              <a:t>System.import</a:t>
+            </a:r>
+            <a:r>
+              <a:rPr lang="pt-BR" dirty="0"/>
+              <a:t> para não quebrar código legado. Todavia, se usamos Babel, precisamos instalar um </a:t>
+            </a:r>
+            <a:r>
+              <a:rPr lang="pt-BR" dirty="0" err="1"/>
+              <a:t>plugin</a:t>
+            </a:r>
+            <a:r>
+              <a:rPr lang="pt-BR" dirty="0"/>
+              <a:t> que ensine para Babel que a sintaxe </a:t>
+            </a:r>
+            <a:r>
+              <a:rPr lang="pt-BR" dirty="0" err="1"/>
+              <a:t>import</a:t>
+            </a:r>
+            <a:r>
+              <a:rPr lang="pt-BR" dirty="0"/>
+              <a:t> é uma sintaxe válida.</a:t>
+            </a:r>
+          </a:p>
+          <a:p>
+            <a:endParaRPr lang="pt-BR" dirty="0"/>
+          </a:p>
+          <a:p>
+            <a:pPr marL="0" indent="0">
+              <a:buNone/>
+            </a:pPr>
+            <a:r>
+              <a:rPr lang="pt-BR" dirty="0"/>
+              <a:t>Basta usarmos </a:t>
+            </a:r>
+            <a:r>
+              <a:rPr lang="pt-BR" dirty="0" err="1"/>
+              <a:t>System.import</a:t>
+            </a:r>
+            <a:r>
+              <a:rPr lang="pt-BR" dirty="0"/>
+              <a:t> para carregarmos dinamicamente módulos em nosso aplicação no lugar da instrução import. O módulo não deve ser importado estaticamente em nenhum outro ponto da aplicação.</a:t>
+            </a:r>
+          </a:p>
+          <a:p>
+            <a:endParaRPr lang="pt-BR" dirty="0"/>
+          </a:p>
+          <a:p>
+            <a:pPr marL="0" indent="0">
+              <a:buNone/>
+            </a:pPr>
+            <a:r>
+              <a:rPr lang="pt-BR" dirty="0"/>
+              <a:t> É importante que o módulo carregado sob demanda não esteja estaticamente importado em nenhum outro ponto da aplicação, caso contrário ele fará parte do </a:t>
+            </a:r>
+            <a:r>
+              <a:rPr lang="pt-BR" dirty="0" err="1"/>
+              <a:t>bundle</a:t>
+            </a:r>
+            <a:r>
+              <a:rPr lang="pt-BR" dirty="0"/>
+              <a:t>.</a:t>
+            </a:r>
           </a:p>
         </p:txBody>
       </p:sp>
@@ -3293,7 +3441,10 @@
           <a:bodyPr/>
           <a:lstStyle/>
           <a:p>
-            <a:endParaRPr lang="pt-BR"/>
+            <a:r>
+              <a:rPr lang="pt-BR" dirty="0"/>
+              <a:t>Observação : </a:t>
+            </a:r>
           </a:p>
         </p:txBody>
       </p:sp>
@@ -3312,7 +3463,10 @@
           <a:bodyPr/>
           <a:lstStyle/>
           <a:p>
-            <a:endParaRPr lang="pt-BR"/>
+            <a:r>
+              <a:rPr lang="pt-BR" dirty="0"/>
+              <a:t>Sempre lembrar de deixar na pasta “server” SEMPRE o Servidor rodando em localhost:3000. Para que as importações e as chamadas REST funcionem</a:t>
+            </a:r>
           </a:p>
         </p:txBody>
       </p:sp>
@@ -3320,6 +3474,275 @@
     <p:extLst>
       <p:ext uri="{BB962C8B-B14F-4D97-AF65-F5344CB8AC3E}">
         <p14:creationId xmlns:p14="http://schemas.microsoft.com/office/powerpoint/2010/main" val="1965684712"/>
+      </p:ext>
+    </p:extLst>
+  </p:cSld>
+  <p:clrMapOvr>
+    <a:masterClrMapping/>
+  </p:clrMapOvr>
+</p:sld>
+</file>
+
+<file path=ppt/slides/slide13.xml><?xml version="1.0" encoding="utf-8"?>
+<p:sld xmlns:a="http://schemas.openxmlformats.org/drawingml/2006/main" xmlns:r="http://schemas.openxmlformats.org/officeDocument/2006/relationships" xmlns:p="http://schemas.openxmlformats.org/presentationml/2006/main">
+  <p:cSld>
+    <p:spTree>
+      <p:nvGrpSpPr>
+        <p:cNvPr id="1" name=""/>
+        <p:cNvGrpSpPr/>
+        <p:nvPr/>
+      </p:nvGrpSpPr>
+      <p:grpSpPr>
+        <a:xfrm>
+          <a:off x="0" y="0"/>
+          <a:ext cx="0" cy="0"/>
+          <a:chOff x="0" y="0"/>
+          <a:chExt cx="0" cy="0"/>
+        </a:xfrm>
+      </p:grpSpPr>
+      <p:sp>
+        <p:nvSpPr>
+          <p:cNvPr id="2" name="Título 1"/>
+          <p:cNvSpPr>
+            <a:spLocks noGrp="1"/>
+          </p:cNvSpPr>
+          <p:nvPr>
+            <p:ph type="title"/>
+          </p:nvPr>
+        </p:nvSpPr>
+        <p:spPr/>
+        <p:txBody>
+          <a:bodyPr/>
+          <a:lstStyle/>
+          <a:p>
+            <a:r>
+              <a:rPr lang="pt-BR" dirty="0"/>
+              <a:t>Resumo do capítulo</a:t>
+            </a:r>
+          </a:p>
+        </p:txBody>
+      </p:sp>
+      <p:sp>
+        <p:nvSpPr>
+          <p:cNvPr id="3" name="Espaço Reservado para Conteúdo 2"/>
+          <p:cNvSpPr>
+            <a:spLocks noGrp="1"/>
+          </p:cNvSpPr>
+          <p:nvPr>
+            <p:ph idx="1"/>
+          </p:nvPr>
+        </p:nvSpPr>
+        <p:spPr/>
+        <p:txBody>
+          <a:bodyPr>
+            <a:normAutofit fontScale="92500"/>
+          </a:bodyPr>
+          <a:lstStyle/>
+          <a:p>
+            <a:r>
+              <a:rPr lang="pt-BR" dirty="0"/>
+              <a:t>Otimização com </a:t>
+            </a:r>
+            <a:r>
+              <a:rPr lang="pt-BR" dirty="0" err="1"/>
+              <a:t>scope</a:t>
+            </a:r>
+            <a:r>
+              <a:rPr lang="pt-BR" dirty="0"/>
+              <a:t> </a:t>
+            </a:r>
+            <a:r>
+              <a:rPr lang="pt-BR" dirty="0" err="1"/>
+              <a:t>hoisting</a:t>
+            </a:r>
+            <a:endParaRPr lang="pt-BR" dirty="0"/>
+          </a:p>
+          <a:p>
+            <a:r>
+              <a:rPr lang="pt-BR" dirty="0"/>
+              <a:t>Separação do nosso código das bibliotecas com o </a:t>
+            </a:r>
+            <a:r>
+              <a:rPr lang="pt-BR" dirty="0" err="1"/>
+              <a:t>CommonsChunkPlugin</a:t>
+            </a:r>
+            <a:endParaRPr lang="pt-BR" dirty="0"/>
+          </a:p>
+          <a:p>
+            <a:r>
+              <a:rPr lang="pt-BR" dirty="0"/>
+              <a:t>Geração de </a:t>
+            </a:r>
+            <a:r>
+              <a:rPr lang="pt-BR" dirty="0" err="1"/>
+              <a:t>index.html</a:t>
+            </a:r>
+            <a:r>
+              <a:rPr lang="pt-BR" dirty="0"/>
+              <a:t> automaticamente com todos os artefatos produzidos pelo </a:t>
+            </a:r>
+            <a:r>
+              <a:rPr lang="pt-BR" dirty="0" err="1"/>
+              <a:t>Webpack</a:t>
+            </a:r>
+            <a:r>
+              <a:rPr lang="pt-BR" dirty="0"/>
+              <a:t> já importados.</a:t>
+            </a:r>
+          </a:p>
+          <a:p>
+            <a:r>
+              <a:rPr lang="pt-BR" dirty="0" err="1"/>
+              <a:t>Code</a:t>
+            </a:r>
+            <a:r>
+              <a:rPr lang="pt-BR" dirty="0"/>
+              <a:t> </a:t>
+            </a:r>
+            <a:r>
+              <a:rPr lang="pt-BR" dirty="0" err="1"/>
+              <a:t>splitting</a:t>
+            </a:r>
+            <a:r>
+              <a:rPr lang="pt-BR" dirty="0"/>
+              <a:t> e </a:t>
+            </a:r>
+            <a:r>
+              <a:rPr lang="pt-BR" dirty="0" err="1"/>
+              <a:t>Lazy</a:t>
+            </a:r>
+            <a:r>
+              <a:rPr lang="pt-BR" dirty="0"/>
+              <a:t> </a:t>
+            </a:r>
+            <a:r>
+              <a:rPr lang="pt-BR" dirty="0" err="1"/>
+              <a:t>loading</a:t>
+            </a:r>
+            <a:r>
+              <a:rPr lang="pt-BR" dirty="0"/>
+              <a:t>.</a:t>
+            </a:r>
+          </a:p>
+          <a:p>
+            <a:r>
+              <a:rPr lang="pt-BR" dirty="0"/>
+              <a:t>Sobre utilizar </a:t>
+            </a:r>
+            <a:r>
+              <a:rPr lang="pt-BR" dirty="0" err="1"/>
+              <a:t>System.import</a:t>
+            </a:r>
+            <a:r>
+              <a:rPr lang="pt-BR" dirty="0"/>
+              <a:t>() ou </a:t>
+            </a:r>
+            <a:r>
+              <a:rPr lang="pt-BR" dirty="0" err="1"/>
+              <a:t>import</a:t>
+            </a:r>
+            <a:r>
+              <a:rPr lang="pt-BR" dirty="0"/>
+              <a:t> no carregamento de módulos.</a:t>
+            </a:r>
+          </a:p>
+          <a:p>
+            <a:r>
+              <a:rPr lang="pt-BR" dirty="0"/>
+              <a:t>Onde ficam os arquivos para distribuição do projeto</a:t>
+            </a:r>
+          </a:p>
+          <a:p>
+            <a:r>
+              <a:rPr lang="pt-BR" dirty="0"/>
+              <a:t>Como alterar o endereço da API no build de produção com o </a:t>
+            </a:r>
+            <a:r>
+              <a:rPr lang="pt-BR" dirty="0" err="1"/>
+              <a:t>DefinePlugin</a:t>
+            </a:r>
+            <a:r>
+              <a:rPr lang="pt-BR" dirty="0"/>
+              <a:t>.</a:t>
+            </a:r>
+          </a:p>
+          <a:p>
+            <a:endParaRPr lang="pt-BR" dirty="0"/>
+          </a:p>
+        </p:txBody>
+      </p:sp>
+    </p:spTree>
+    <p:extLst>
+      <p:ext uri="{BB962C8B-B14F-4D97-AF65-F5344CB8AC3E}">
+        <p14:creationId xmlns:p14="http://schemas.microsoft.com/office/powerpoint/2010/main" val="2200220696"/>
+      </p:ext>
+    </p:extLst>
+  </p:cSld>
+  <p:clrMapOvr>
+    <a:masterClrMapping/>
+  </p:clrMapOvr>
+</p:sld>
+</file>
+
+<file path=ppt/slides/slide14.xml><?xml version="1.0" encoding="utf-8"?>
+<p:sld xmlns:a="http://schemas.openxmlformats.org/drawingml/2006/main" xmlns:r="http://schemas.openxmlformats.org/officeDocument/2006/relationships" xmlns:p="http://schemas.openxmlformats.org/presentationml/2006/main">
+  <p:cSld>
+    <p:spTree>
+      <p:nvGrpSpPr>
+        <p:cNvPr id="1" name=""/>
+        <p:cNvGrpSpPr/>
+        <p:nvPr/>
+      </p:nvGrpSpPr>
+      <p:grpSpPr>
+        <a:xfrm>
+          <a:off x="0" y="0"/>
+          <a:ext cx="0" cy="0"/>
+          <a:chOff x="0" y="0"/>
+          <a:chExt cx="0" cy="0"/>
+        </a:xfrm>
+      </p:grpSpPr>
+      <p:sp>
+        <p:nvSpPr>
+          <p:cNvPr id="2" name="Título 1"/>
+          <p:cNvSpPr>
+            <a:spLocks noGrp="1"/>
+          </p:cNvSpPr>
+          <p:nvPr>
+            <p:ph type="title"/>
+          </p:nvPr>
+        </p:nvSpPr>
+        <p:spPr/>
+        <p:txBody>
+          <a:bodyPr/>
+          <a:lstStyle/>
+          <a:p>
+            <a:endParaRPr lang="pt-BR"/>
+          </a:p>
+        </p:txBody>
+      </p:sp>
+      <p:sp>
+        <p:nvSpPr>
+          <p:cNvPr id="3" name="Espaço Reservado para Conteúdo 2"/>
+          <p:cNvSpPr>
+            <a:spLocks noGrp="1"/>
+          </p:cNvSpPr>
+          <p:nvPr>
+            <p:ph idx="1"/>
+          </p:nvPr>
+        </p:nvSpPr>
+        <p:spPr/>
+        <p:txBody>
+          <a:bodyPr/>
+          <a:lstStyle/>
+          <a:p>
+            <a:endParaRPr lang="pt-BR"/>
+          </a:p>
+        </p:txBody>
+      </p:sp>
+    </p:spTree>
+    <p:extLst>
+      <p:ext uri="{BB962C8B-B14F-4D97-AF65-F5344CB8AC3E}">
+        <p14:creationId xmlns:p14="http://schemas.microsoft.com/office/powerpoint/2010/main" val="2124941560"/>
       </p:ext>
     </p:extLst>
   </p:cSld>
@@ -3373,90 +3796,16 @@
               <a:buChar char="•"/>
             </a:pPr>
             <a:r>
-              <a:rPr lang="pt-BR" sz="1600" dirty="0" smtClean="0"/>
+              <a:rPr lang="pt-BR" sz="1600" dirty="0"/>
               <a:t>Se estivéssemos trabalhando com o </a:t>
             </a:r>
             <a:r>
-              <a:rPr lang="pt-BR" sz="1600" dirty="0" err="1" smtClean="0"/>
+              <a:rPr lang="pt-BR" sz="1600" dirty="0" err="1"/>
               <a:t>React</a:t>
             </a:r>
             <a:r>
-              <a:rPr lang="pt-BR" sz="1600" dirty="0" smtClean="0"/>
+              <a:rPr lang="pt-BR" sz="1600" dirty="0"/>
               <a:t> ou Angular 2 muitos desses detalhes de configurações passariam despercebidos, mas estamos trabalhando do zero, sem frameworks.</a:t>
-            </a:r>
-          </a:p>
-          <a:p>
-            <a:pPr marL="285750" indent="-285750" algn="l">
-              <a:buFont typeface="Arial" panose="020B0604020202020204" pitchFamily="34" charset="0"/>
-              <a:buChar char="•"/>
-            </a:pPr>
-            <a:endParaRPr lang="pt-BR" sz="1600" dirty="0" smtClean="0"/>
-          </a:p>
-          <a:p>
-            <a:pPr marL="285750" indent="-285750" algn="l">
-              <a:buFont typeface="Arial" panose="020B0604020202020204" pitchFamily="34" charset="0"/>
-              <a:buChar char="•"/>
-            </a:pPr>
-            <a:r>
-              <a:rPr lang="pt-BR" sz="1600" dirty="0" smtClean="0"/>
-              <a:t>O </a:t>
-            </a:r>
-            <a:r>
-              <a:rPr lang="pt-BR" sz="1600" dirty="0"/>
-              <a:t>babel-core nada mais é do que o núcleo do babel desprovido de sua linha de comando e que pode ser utilizado por outras ferramentas do mercado como </a:t>
-            </a:r>
-            <a:r>
-              <a:rPr lang="pt-BR" sz="1600" dirty="0" err="1"/>
-              <a:t>Webpack</a:t>
-            </a:r>
-            <a:r>
-              <a:rPr lang="pt-BR" sz="1600" dirty="0"/>
-              <a:t>.</a:t>
-            </a:r>
-          </a:p>
-          <a:p>
-            <a:pPr marL="285750" indent="-285750" algn="l">
-              <a:buFont typeface="Arial" panose="020B0604020202020204" pitchFamily="34" charset="0"/>
-              <a:buChar char="•"/>
-            </a:pPr>
-            <a:endParaRPr lang="pt-BR" sz="1600" dirty="0" smtClean="0"/>
-          </a:p>
-          <a:p>
-            <a:pPr marL="285750" indent="-285750" algn="l">
-              <a:buFont typeface="Arial" panose="020B0604020202020204" pitchFamily="34" charset="0"/>
-              <a:buChar char="•"/>
-            </a:pPr>
-            <a:r>
-              <a:rPr lang="pt-BR" sz="1600" dirty="0" err="1" smtClean="0"/>
-              <a:t>Webpack</a:t>
-            </a:r>
-            <a:r>
-              <a:rPr lang="pt-BR" sz="1600" dirty="0" smtClean="0"/>
-              <a:t> </a:t>
-            </a:r>
-            <a:r>
-              <a:rPr lang="pt-BR" sz="1600" dirty="0"/>
-              <a:t>dispensa a utilização de um module </a:t>
-            </a:r>
-            <a:r>
-              <a:rPr lang="pt-BR" sz="1600" dirty="0" err="1"/>
-              <a:t>loader</a:t>
-            </a:r>
-            <a:r>
-              <a:rPr lang="pt-BR" sz="1600" dirty="0"/>
-              <a:t>, justamente por criar em </a:t>
-            </a:r>
-            <a:r>
-              <a:rPr lang="pt-BR" sz="1600" dirty="0" err="1"/>
-              <a:t>bundles</a:t>
-            </a:r>
-            <a:r>
-              <a:rPr lang="pt-BR" sz="1600" dirty="0"/>
-              <a:t> em tempo de desenvolvimento, que nada mais são do que scripts que agregam outros módulos da aplicação</a:t>
-            </a:r>
-            <a:r>
-              <a:rPr lang="pt-BR" sz="1600" dirty="0" smtClean="0"/>
-              <a:t>.</a:t>
             </a:r>
           </a:p>
           <a:p>
@@ -3473,30 +3822,14 @@
             </a:pPr>
             <a:r>
               <a:rPr lang="pt-BR" sz="1600" dirty="0"/>
-              <a:t>É comum utilizar um </a:t>
+              <a:t>O babel-core nada mais é do que o núcleo do babel desprovido de sua linha de comando e que pode ser utilizado por outras ferramentas do mercado como </a:t>
             </a:r>
             <a:r>
               <a:rPr lang="pt-BR" sz="1600" dirty="0" err="1"/>
-              <a:t>npm</a:t>
+              <a:t>Webpack</a:t>
             </a:r>
             <a:r>
               <a:rPr lang="pt-BR" sz="1600" dirty="0"/>
-              <a:t> script para executar o </a:t>
-            </a:r>
-            <a:r>
-              <a:rPr lang="pt-BR" sz="1600" dirty="0" err="1"/>
-              <a:t>webpack</a:t>
-            </a:r>
-            <a:r>
-              <a:rPr lang="pt-BR" sz="1600" dirty="0"/>
-              <a:t> bastando adicioná-lo no arquivo </a:t>
-            </a:r>
-            <a:r>
-              <a:rPr lang="pt-BR" sz="1600" dirty="0" err="1"/>
-              <a:t>package.json</a:t>
-            </a:r>
-            <a:r>
-              <a:rPr lang="pt-BR" sz="1600" dirty="0" smtClean="0"/>
               <a:t>.</a:t>
             </a:r>
           </a:p>
@@ -3505,7 +3838,85 @@
               <a:buFont typeface="Arial" panose="020B0604020202020204" pitchFamily="34" charset="0"/>
               <a:buChar char="•"/>
             </a:pPr>
-            <a:endParaRPr lang="pt-BR" sz="1600" dirty="0" smtClean="0"/>
+            <a:endParaRPr lang="pt-BR" sz="1600" dirty="0"/>
+          </a:p>
+          <a:p>
+            <a:pPr marL="285750" indent="-285750" algn="l">
+              <a:buFont typeface="Arial" panose="020B0604020202020204" pitchFamily="34" charset="0"/>
+              <a:buChar char="•"/>
+            </a:pPr>
+            <a:r>
+              <a:rPr lang="pt-BR" sz="1600" dirty="0" err="1"/>
+              <a:t>Webpack</a:t>
+            </a:r>
+            <a:r>
+              <a:rPr lang="pt-BR" sz="1600" dirty="0"/>
+              <a:t> dispensa a utilização de um module </a:t>
+            </a:r>
+            <a:r>
+              <a:rPr lang="pt-BR" sz="1600" dirty="0" err="1"/>
+              <a:t>loader</a:t>
+            </a:r>
+            <a:r>
+              <a:rPr lang="pt-BR" sz="1600" dirty="0"/>
+              <a:t>, justamente por criar em </a:t>
+            </a:r>
+            <a:r>
+              <a:rPr lang="pt-BR" sz="1600" dirty="0" err="1"/>
+              <a:t>bundles</a:t>
+            </a:r>
+            <a:r>
+              <a:rPr lang="pt-BR" sz="1600" dirty="0"/>
+              <a:t> em tempo de desenvolvimento, que nada mais são do que scripts que agregam outros módulos da aplicação.</a:t>
+            </a:r>
+          </a:p>
+          <a:p>
+            <a:pPr marL="285750" indent="-285750" algn="l">
+              <a:buFont typeface="Arial" panose="020B0604020202020204" pitchFamily="34" charset="0"/>
+              <a:buChar char="•"/>
+            </a:pPr>
+            <a:endParaRPr lang="pt-BR" sz="1600" dirty="0"/>
+          </a:p>
+          <a:p>
+            <a:pPr marL="285750" indent="-285750" algn="l">
+              <a:buFont typeface="Arial" panose="020B0604020202020204" pitchFamily="34" charset="0"/>
+              <a:buChar char="•"/>
+            </a:pPr>
+            <a:r>
+              <a:rPr lang="pt-BR" sz="1600" dirty="0"/>
+              <a:t>É comum utilizar um </a:t>
+            </a:r>
+            <a:r>
+              <a:rPr lang="pt-BR" sz="1600" dirty="0" err="1"/>
+              <a:t>npm</a:t>
+            </a:r>
+            <a:r>
+              <a:rPr lang="pt-BR" sz="1600" dirty="0"/>
+              <a:t> script para executar o </a:t>
+            </a:r>
+            <a:r>
+              <a:rPr lang="pt-BR" sz="1600" dirty="0" err="1"/>
+              <a:t>webpack</a:t>
+            </a:r>
+            <a:r>
+              <a:rPr lang="pt-BR" sz="1600" dirty="0"/>
+              <a:t> bastando adicioná-lo no arquivo </a:t>
+            </a:r>
+            <a:r>
+              <a:rPr lang="pt-BR" sz="1600" dirty="0" err="1"/>
+              <a:t>package.json</a:t>
+            </a:r>
+            <a:r>
+              <a:rPr lang="pt-BR" sz="1600" dirty="0"/>
+              <a:t>.</a:t>
+            </a:r>
+          </a:p>
+          <a:p>
+            <a:pPr marL="285750" indent="-285750" algn="l">
+              <a:buFont typeface="Arial" panose="020B0604020202020204" pitchFamily="34" charset="0"/>
+              <a:buChar char="•"/>
+            </a:pPr>
+            <a:endParaRPr lang="pt-BR" sz="1600" dirty="0"/>
           </a:p>
           <a:p>
             <a:pPr marL="285750" indent="-285750" algn="l">
@@ -3550,10 +3961,9 @@
           <a:lstStyle/>
           <a:p>
             <a:r>
-              <a:rPr lang="pt-BR" sz="2800" b="1" dirty="0" smtClean="0"/>
+              <a:rPr lang="pt-BR" sz="2800" b="1" dirty="0"/>
               <a:t>Configurações Iniciais</a:t>
             </a:r>
-            <a:endParaRPr lang="pt-BR" sz="2800" b="1" dirty="0"/>
           </a:p>
         </p:txBody>
       </p:sp>
@@ -3610,7 +4020,7 @@
           <a:lstStyle/>
           <a:p>
             <a:r>
-              <a:rPr lang="pt-BR" sz="2800" dirty="0" smtClean="0">
+              <a:rPr lang="pt-BR" sz="2800" dirty="0">
                 <a:solidFill>
                   <a:srgbClr val="3D464D"/>
                 </a:solidFill>
@@ -3619,7 +4029,7 @@
               <a:t>Babel-</a:t>
             </a:r>
             <a:r>
-              <a:rPr lang="pt-BR" sz="2800" dirty="0" err="1" smtClean="0">
+              <a:rPr lang="pt-BR" sz="2800" dirty="0" err="1">
                 <a:solidFill>
                   <a:srgbClr val="3D464D"/>
                 </a:solidFill>
@@ -3669,7 +4079,7 @@
           <a:p>
             <a:pPr algn="l"/>
             <a:r>
-              <a:rPr lang="pt-BR" sz="1800" dirty="0" smtClean="0">
+              <a:rPr lang="pt-BR" sz="1800" dirty="0">
                 <a:solidFill>
                   <a:srgbClr val="3D464D"/>
                 </a:solidFill>
@@ -3678,7 +4088,7 @@
               <a:t>É a ponte entre o </a:t>
             </a:r>
             <a:r>
-              <a:rPr lang="pt-BR" sz="1800" dirty="0" err="1" smtClean="0">
+              <a:rPr lang="pt-BR" sz="1800" dirty="0" err="1">
                 <a:solidFill>
                   <a:srgbClr val="3D464D"/>
                 </a:solidFill>
@@ -3687,7 +4097,7 @@
               <a:t>Webpack</a:t>
             </a:r>
             <a:r>
-              <a:rPr lang="pt-BR" sz="1800" dirty="0" smtClean="0">
+              <a:rPr lang="pt-BR" sz="1800" dirty="0">
                 <a:solidFill>
                   <a:srgbClr val="3D464D"/>
                 </a:solidFill>
@@ -3708,7 +4118,7 @@
           <a:p>
             <a:pPr algn="l"/>
             <a:r>
-              <a:rPr lang="pt-BR" sz="1800" dirty="0" smtClean="0">
+              <a:rPr lang="pt-BR" sz="1800" dirty="0">
                 <a:solidFill>
                   <a:srgbClr val="3D464D"/>
                 </a:solidFill>
@@ -4192,7 +4602,7 @@
           <a:p>
             <a:pPr algn="l"/>
             <a:r>
-              <a:rPr lang="pt-BR" sz="1600" dirty="0" smtClean="0">
+              <a:rPr lang="pt-BR" sz="1600" dirty="0">
                 <a:solidFill>
                   <a:srgbClr val="3D464D"/>
                 </a:solidFill>
@@ -4201,7 +4611,7 @@
               <a:t>Quando usamos o </a:t>
             </a:r>
             <a:r>
-              <a:rPr lang="pt-BR" sz="1600" b="1" dirty="0" smtClean="0">
+              <a:rPr lang="pt-BR" sz="1600" b="1" dirty="0">
                 <a:solidFill>
                   <a:srgbClr val="3D464D"/>
                 </a:solidFill>
@@ -4210,7 +4620,7 @@
               <a:t>–p</a:t>
             </a:r>
             <a:r>
-              <a:rPr lang="pt-BR" sz="1600" dirty="0" smtClean="0">
+              <a:rPr lang="pt-BR" sz="1600" dirty="0">
                 <a:solidFill>
                   <a:srgbClr val="3D464D"/>
                 </a:solidFill>
@@ -4219,7 +4629,7 @@
               <a:t>, internamente o </a:t>
             </a:r>
             <a:r>
-              <a:rPr lang="pt-BR" sz="1600" dirty="0" err="1" smtClean="0">
+              <a:rPr lang="pt-BR" sz="1600" dirty="0" err="1">
                 <a:solidFill>
                   <a:srgbClr val="3D464D"/>
                 </a:solidFill>
@@ -4228,7 +4638,7 @@
               <a:t>webpack</a:t>
             </a:r>
             <a:r>
-              <a:rPr lang="pt-BR" sz="1600" dirty="0" smtClean="0">
+              <a:rPr lang="pt-BR" sz="1600" dirty="0">
                 <a:solidFill>
                   <a:srgbClr val="3D464D"/>
                 </a:solidFill>
@@ -4237,7 +4647,7 @@
               <a:t> vai chamar o </a:t>
             </a:r>
             <a:r>
-              <a:rPr lang="pt-BR" sz="1600" b="1" dirty="0" err="1" smtClean="0">
+              <a:rPr lang="pt-BR" sz="1600" b="1" dirty="0" err="1">
                 <a:solidFill>
                   <a:schemeClr val="accent5"/>
                 </a:solidFill>
@@ -4246,7 +4656,7 @@
               <a:t>uglify</a:t>
             </a:r>
             <a:r>
-              <a:rPr lang="pt-BR" sz="1600" dirty="0" smtClean="0">
+              <a:rPr lang="pt-BR" sz="1600" dirty="0">
                 <a:solidFill>
                   <a:srgbClr val="3D464D"/>
                 </a:solidFill>
@@ -4255,7 +4665,7 @@
               <a:t> um módulo famoso para </a:t>
             </a:r>
             <a:r>
-              <a:rPr lang="pt-BR" sz="1800" b="1" i="1" u="sng" dirty="0" smtClean="0">
+              <a:rPr lang="pt-BR" sz="1800" b="1" i="1" u="sng" dirty="0">
                 <a:solidFill>
                   <a:srgbClr val="3D464D"/>
                 </a:solidFill>
@@ -4264,7 +4674,7 @@
               <a:t>MINIFICAR</a:t>
             </a:r>
             <a:r>
-              <a:rPr lang="pt-BR" sz="1600" dirty="0" smtClean="0">
+              <a:rPr lang="pt-BR" sz="1600" dirty="0">
                 <a:solidFill>
                   <a:srgbClr val="3D464D"/>
                 </a:solidFill>
@@ -4273,7 +4683,7 @@
               <a:t> arquivos </a:t>
             </a:r>
             <a:r>
-              <a:rPr lang="pt-BR" sz="1600" dirty="0" err="1" smtClean="0">
+              <a:rPr lang="pt-BR" sz="1600" dirty="0" err="1">
                 <a:solidFill>
                   <a:srgbClr val="3D464D"/>
                 </a:solidFill>
@@ -4282,7 +4692,7 @@
               <a:t>Javascript</a:t>
             </a:r>
             <a:r>
-              <a:rPr lang="pt-BR" sz="1600" dirty="0" smtClean="0">
+              <a:rPr lang="pt-BR" sz="1600" dirty="0">
                 <a:solidFill>
                   <a:srgbClr val="3D464D"/>
                 </a:solidFill>
@@ -4303,7 +4713,7 @@
           <a:p>
             <a:pPr algn="l"/>
             <a:r>
-              <a:rPr lang="pt-BR" sz="1600" dirty="0" smtClean="0">
+              <a:rPr lang="pt-BR" sz="1600" dirty="0">
                 <a:solidFill>
                   <a:srgbClr val="3D464D"/>
                 </a:solidFill>
@@ -4312,7 +4722,7 @@
               <a:t>O </a:t>
             </a:r>
             <a:r>
-              <a:rPr lang="pt-BR" sz="1600" dirty="0" err="1" smtClean="0">
+              <a:rPr lang="pt-BR" sz="1600" dirty="0" err="1">
                 <a:solidFill>
                   <a:srgbClr val="3D464D"/>
                 </a:solidFill>
@@ -4321,7 +4731,7 @@
               <a:t>uglify</a:t>
             </a:r>
             <a:r>
-              <a:rPr lang="pt-BR" sz="1600" dirty="0" smtClean="0">
+              <a:rPr lang="pt-BR" sz="1600" dirty="0">
                 <a:solidFill>
                   <a:srgbClr val="3D464D"/>
                 </a:solidFill>
@@ -4342,7 +4752,7 @@
           <a:p>
             <a:pPr algn="l"/>
             <a:r>
-              <a:rPr lang="pt-BR" sz="1600" dirty="0" smtClean="0">
+              <a:rPr lang="pt-BR" sz="1600" dirty="0">
                 <a:solidFill>
                   <a:srgbClr val="3D464D"/>
                 </a:solidFill>
@@ -4351,7 +4761,7 @@
               <a:t>Instalaremos o </a:t>
             </a:r>
             <a:r>
-              <a:rPr lang="pt-BR" sz="1600" b="1" dirty="0" err="1" smtClean="0">
+              <a:rPr lang="pt-BR" sz="1600" b="1" dirty="0" err="1">
                 <a:solidFill>
                   <a:srgbClr val="3D464D"/>
                 </a:solidFill>
@@ -4360,7 +4770,7 @@
               <a:t>babili</a:t>
             </a:r>
             <a:r>
-              <a:rPr lang="pt-BR" sz="1600" dirty="0" smtClean="0">
+              <a:rPr lang="pt-BR" sz="1600" dirty="0">
                 <a:solidFill>
                   <a:srgbClr val="3D464D"/>
                 </a:solidFill>
@@ -4564,10 +4974,9 @@
           <a:p>
             <a:pPr algn="ctr"/>
             <a:r>
-              <a:rPr lang="pt-BR" sz="2800" b="1" dirty="0" smtClean="0"/>
+              <a:rPr lang="pt-BR" sz="2800" b="1" dirty="0"/>
               <a:t>Revisando o Capítulo Anterior</a:t>
             </a:r>
-            <a:endParaRPr lang="pt-BR" sz="2800" b="1" dirty="0"/>
           </a:p>
         </p:txBody>
       </p:sp>
@@ -4601,11 +5010,7 @@
           <a:p>
             <a:r>
               <a:rPr lang="pt-BR" sz="2400" dirty="0"/>
-              <a:t>O efeito do parâmetro -p para o build de produção</a:t>
-            </a:r>
-            <a:r>
-              <a:rPr lang="pt-BR" sz="2400" dirty="0" smtClean="0"/>
-              <a:t>.</a:t>
+              <a:t>O efeito do parâmetro -p para o build de produção.</a:t>
             </a:r>
           </a:p>
           <a:p>
@@ -4622,11 +5027,7 @@
             </a:r>
             <a:r>
               <a:rPr lang="pt-BR" sz="2400" dirty="0"/>
-              <a:t> com código que não sejam escritos em ECMASCRIPT 5</a:t>
-            </a:r>
-            <a:r>
-              <a:rPr lang="pt-BR" sz="2400" dirty="0" smtClean="0"/>
-              <a:t>.</a:t>
+              <a:t> com código que não sejam escritos em ECMASCRIPT 5.</a:t>
             </a:r>
           </a:p>
           <a:p>
@@ -4654,7 +5055,7 @@
               <a:t>minificação</a:t>
             </a:r>
             <a:r>
-              <a:rPr lang="pt-BR" sz="2400" dirty="0" smtClean="0"/>
+              <a:rPr lang="pt-BR" sz="2400" dirty="0"/>
               <a:t>.</a:t>
             </a:r>
           </a:p>
@@ -4664,11 +5065,7 @@
           <a:p>
             <a:r>
               <a:rPr lang="pt-BR" sz="2400" dirty="0"/>
-              <a:t>pegadinhas na atribuição de variáveis de ambiente</a:t>
-            </a:r>
-            <a:r>
-              <a:rPr lang="pt-BR" sz="2400" dirty="0" smtClean="0"/>
-              <a:t>.</a:t>
+              <a:t>pegadinhas na atribuição de variáveis de ambiente.</a:t>
             </a:r>
           </a:p>
           <a:p>
@@ -4799,55 +5196,55 @@
           <a:lstStyle/>
           <a:p>
             <a:r>
-              <a:rPr lang="pt-BR" sz="2400" dirty="0" smtClean="0"/>
+              <a:rPr lang="pt-BR" sz="2400" dirty="0"/>
               <a:t>Um Servidor que se integra com o </a:t>
             </a:r>
             <a:r>
-              <a:rPr lang="pt-BR" sz="2400" dirty="0" err="1" smtClean="0"/>
+              <a:rPr lang="pt-BR" sz="2400" dirty="0" err="1"/>
               <a:t>Webpack</a:t>
             </a:r>
             <a:r>
-              <a:rPr lang="pt-BR" sz="2400" dirty="0" smtClean="0"/>
+              <a:rPr lang="pt-BR" sz="2400" dirty="0"/>
               <a:t> e é utilizado por diversos frameworks </a:t>
             </a:r>
             <a:r>
-              <a:rPr lang="pt-BR" sz="2400" b="1" dirty="0" smtClean="0"/>
+              <a:rPr lang="pt-BR" sz="2400" b="1" dirty="0"/>
               <a:t>Single Page </a:t>
             </a:r>
             <a:r>
-              <a:rPr lang="pt-BR" sz="2400" b="1" dirty="0" err="1" smtClean="0"/>
+              <a:rPr lang="pt-BR" sz="2400" b="1" dirty="0" err="1"/>
               <a:t>Applications</a:t>
             </a:r>
             <a:r>
-              <a:rPr lang="pt-BR" sz="2400" dirty="0" smtClean="0"/>
+              <a:rPr lang="pt-BR" sz="2400" dirty="0"/>
               <a:t>, pelos </a:t>
             </a:r>
             <a:r>
-              <a:rPr lang="pt-BR" sz="2400" b="1" dirty="0" err="1" smtClean="0"/>
+              <a:rPr lang="pt-BR" sz="2400" b="1" dirty="0" err="1"/>
               <a:t>Command</a:t>
             </a:r>
             <a:r>
-              <a:rPr lang="pt-BR" sz="2400" b="1" dirty="0" smtClean="0"/>
+              <a:rPr lang="pt-BR" sz="2400" b="1" dirty="0"/>
               <a:t> </a:t>
             </a:r>
             <a:r>
-              <a:rPr lang="pt-BR" sz="2400" b="1" dirty="0" err="1" smtClean="0"/>
+              <a:rPr lang="pt-BR" sz="2400" b="1" dirty="0" err="1"/>
               <a:t>Line</a:t>
             </a:r>
             <a:r>
-              <a:rPr lang="pt-BR" sz="2400" b="1" dirty="0" smtClean="0"/>
+              <a:rPr lang="pt-BR" sz="2400" b="1" dirty="0"/>
               <a:t> Interfaces </a:t>
             </a:r>
             <a:r>
-              <a:rPr lang="pt-BR" sz="2400" dirty="0" smtClean="0"/>
+              <a:rPr lang="pt-BR" sz="2400" dirty="0"/>
               <a:t>(</a:t>
             </a:r>
             <a:r>
-              <a:rPr lang="pt-BR" sz="2400" b="1" dirty="0" smtClean="0"/>
+              <a:rPr lang="pt-BR" sz="2400" b="1" dirty="0"/>
               <a:t>CLI</a:t>
             </a:r>
             <a:r>
-              <a:rPr lang="pt-BR" sz="2400" dirty="0" smtClean="0"/>
+              <a:rPr lang="pt-BR" sz="2400" dirty="0"/>
               <a:t>). Para usá-lo precisaremos adequar o projeto. </a:t>
             </a:r>
           </a:p>
@@ -4856,23 +5253,23 @@
           </a:p>
           <a:p>
             <a:r>
-              <a:rPr lang="pt-BR" sz="2400" dirty="0" smtClean="0"/>
+              <a:rPr lang="pt-BR" sz="2400" dirty="0"/>
               <a:t>O </a:t>
             </a:r>
             <a:r>
-              <a:rPr lang="pt-BR" sz="2400" dirty="0" err="1" smtClean="0"/>
+              <a:rPr lang="pt-BR" sz="2400" dirty="0" err="1"/>
               <a:t>Webpack</a:t>
             </a:r>
             <a:r>
-              <a:rPr lang="pt-BR" sz="2400" dirty="0" smtClean="0"/>
+              <a:rPr lang="pt-BR" sz="2400" dirty="0"/>
               <a:t>-</a:t>
             </a:r>
             <a:r>
-              <a:rPr lang="pt-BR" sz="2400" dirty="0" err="1" smtClean="0"/>
+              <a:rPr lang="pt-BR" sz="2400" dirty="0" err="1"/>
               <a:t>dev</a:t>
             </a:r>
             <a:r>
-              <a:rPr lang="pt-BR" sz="2400" dirty="0" smtClean="0"/>
+              <a:rPr lang="pt-BR" sz="2400" dirty="0"/>
               <a:t>-server cria o Bundle.js em memória</a:t>
             </a:r>
           </a:p>
@@ -4881,12 +5278,8 @@
           </a:p>
           <a:p>
             <a:r>
-              <a:rPr lang="pt-BR" sz="2400" dirty="0" smtClean="0"/>
-              <a:t>Vantagens </a:t>
-            </a:r>
-            <a:r>
-              <a:rPr lang="pt-BR" sz="2400" dirty="0"/>
-              <a:t>como </a:t>
+              <a:rPr lang="pt-BR" sz="2400" dirty="0"/>
+              <a:t>Vantagens como </a:t>
             </a:r>
             <a:r>
               <a:rPr lang="pt-BR" sz="2400" dirty="0" err="1"/>
@@ -4897,11 +5290,11 @@
               <a:t> </a:t>
             </a:r>
             <a:r>
-              <a:rPr lang="pt-BR" sz="2400" dirty="0" err="1" smtClean="0"/>
+              <a:rPr lang="pt-BR" sz="2400" dirty="0" err="1"/>
               <a:t>reloading</a:t>
             </a:r>
             <a:r>
-              <a:rPr lang="pt-BR" sz="2400" dirty="0" smtClean="0"/>
+              <a:rPr lang="pt-BR" sz="2400" dirty="0"/>
               <a:t>;</a:t>
             </a:r>
           </a:p>
@@ -4930,34 +5323,30 @@
               <a:t> Server através do </a:t>
             </a:r>
             <a:r>
-              <a:rPr lang="pt-BR" sz="2400" dirty="0" err="1" smtClean="0"/>
+              <a:rPr lang="pt-BR" sz="2400" dirty="0" err="1"/>
               <a:t>npm</a:t>
             </a:r>
-            <a:endParaRPr lang="pt-BR" sz="2400" dirty="0" smtClean="0"/>
-          </a:p>
-          <a:p>
             <a:endParaRPr lang="pt-BR" sz="2400" dirty="0"/>
           </a:p>
           <a:p>
-            <a:r>
-              <a:rPr lang="pt-BR" sz="2400" dirty="0" smtClean="0"/>
-              <a:t>A </a:t>
-            </a:r>
-            <a:r>
-              <a:rPr lang="pt-BR" sz="2400" dirty="0"/>
-              <a:t>importância da propriedade </a:t>
+            <a:endParaRPr lang="pt-BR" sz="2400" dirty="0"/>
+          </a:p>
+          <a:p>
+            <a:r>
+              <a:rPr lang="pt-BR" sz="2400" dirty="0"/>
+              <a:t>A importância da propriedade </a:t>
             </a:r>
             <a:r>
               <a:rPr lang="pt-BR" sz="2400" b="1" dirty="0" err="1"/>
               <a:t>publicPath</a:t>
             </a:r>
             <a:r>
-              <a:rPr lang="pt-BR" sz="2400" dirty="0" smtClean="0"/>
+              <a:rPr lang="pt-BR" sz="2400" dirty="0"/>
               <a:t>.</a:t>
             </a:r>
           </a:p>
           <a:p>
-            <a:endParaRPr lang="pt-BR" sz="2400" dirty="0" smtClean="0"/>
+            <a:endParaRPr lang="pt-BR" sz="2400" dirty="0"/>
           </a:p>
           <a:p>
             <a:r>
@@ -4974,11 +5363,7 @@
             </a:r>
             <a:r>
               <a:rPr lang="pt-BR" sz="2400" dirty="0"/>
-              <a:t> Server é um servidor capaz de ler as configurações de webpack.config.js ao ser carregado</a:t>
-            </a:r>
-            <a:r>
-              <a:rPr lang="pt-BR" sz="2400" dirty="0" smtClean="0"/>
-              <a:t>.</a:t>
+              <a:t> Server é um servidor capaz de ler as configurações de webpack.config.js ao ser carregado.</a:t>
             </a:r>
           </a:p>
           <a:p>
@@ -5006,7 +5391,6 @@
               <a:rPr lang="pt-BR" sz="2400" dirty="0"/>
               <a:t>, pois é nada mais nada menos do que um módulo do Node.js.</a:t>
             </a:r>
-            <a:endParaRPr lang="pt-BR" sz="2400" dirty="0" smtClean="0"/>
           </a:p>
           <a:p>
             <a:endParaRPr lang="pt-BR" sz="2400" dirty="0"/>
@@ -5070,34 +5454,33 @@
           <a:p>
             <a:pPr algn="ctr"/>
             <a:r>
-              <a:rPr lang="pt-BR" sz="2800" b="1" dirty="0" smtClean="0"/>
+              <a:rPr lang="pt-BR" sz="2800" b="1" dirty="0"/>
               <a:t>FOUC ( Flash </a:t>
             </a:r>
             <a:r>
-              <a:rPr lang="pt-BR" sz="2800" b="1" dirty="0" err="1" smtClean="0"/>
+              <a:rPr lang="pt-BR" sz="2800" b="1" dirty="0" err="1"/>
               <a:t>of</a:t>
             </a:r>
             <a:r>
-              <a:rPr lang="pt-BR" sz="2800" b="1" dirty="0" smtClean="0"/>
+              <a:rPr lang="pt-BR" sz="2800" b="1" dirty="0"/>
               <a:t> </a:t>
             </a:r>
             <a:r>
-              <a:rPr lang="pt-BR" sz="2800" b="1" dirty="0" err="1" smtClean="0"/>
+              <a:rPr lang="pt-BR" sz="2800" b="1" dirty="0" err="1"/>
               <a:t>Unstyled</a:t>
             </a:r>
             <a:r>
-              <a:rPr lang="pt-BR" sz="2800" b="1" dirty="0" smtClean="0"/>
+              <a:rPr lang="pt-BR" sz="2800" b="1" dirty="0"/>
               <a:t> </a:t>
             </a:r>
             <a:r>
-              <a:rPr lang="pt-BR" sz="2800" b="1" dirty="0" err="1" smtClean="0"/>
+              <a:rPr lang="pt-BR" sz="2800" b="1" dirty="0" err="1"/>
               <a:t>Content</a:t>
             </a:r>
             <a:r>
-              <a:rPr lang="pt-BR" sz="2800" b="1" dirty="0" smtClean="0"/>
+              <a:rPr lang="pt-BR" sz="2800" b="1" dirty="0"/>
               <a:t>)</a:t>
             </a:r>
-            <a:endParaRPr lang="pt-BR" sz="2800" b="1" dirty="0"/>
           </a:p>
         </p:txBody>
       </p:sp>
@@ -5130,58 +5513,58 @@
           <a:lstStyle/>
           <a:p>
             <a:r>
-              <a:rPr lang="pt-BR" sz="2400" dirty="0" smtClean="0"/>
+              <a:rPr lang="pt-BR" sz="2400" dirty="0"/>
               <a:t>O bundle.js quando foi </a:t>
             </a:r>
             <a:r>
-              <a:rPr lang="pt-BR" sz="2400" dirty="0" err="1" smtClean="0"/>
+              <a:rPr lang="pt-BR" sz="2400" dirty="0" err="1"/>
               <a:t>minificado</a:t>
             </a:r>
             <a:r>
-              <a:rPr lang="pt-BR" sz="2400" dirty="0" smtClean="0"/>
+              <a:rPr lang="pt-BR" sz="2400" dirty="0"/>
               <a:t> inseriu o </a:t>
             </a:r>
             <a:r>
-              <a:rPr lang="pt-BR" sz="2400" dirty="0" err="1" smtClean="0"/>
+              <a:rPr lang="pt-BR" sz="2400" dirty="0" err="1"/>
               <a:t>css</a:t>
             </a:r>
             <a:r>
-              <a:rPr lang="pt-BR" sz="2400" dirty="0" smtClean="0"/>
+              <a:rPr lang="pt-BR" sz="2400" dirty="0"/>
               <a:t> dentro do </a:t>
             </a:r>
             <a:r>
-              <a:rPr lang="pt-BR" sz="2400" dirty="0" err="1" smtClean="0"/>
+              <a:rPr lang="pt-BR" sz="2400" dirty="0" err="1"/>
               <a:t>bundle</a:t>
             </a:r>
-            <a:endParaRPr lang="pt-BR" sz="2400" dirty="0" smtClean="0"/>
-          </a:p>
-          <a:p>
-            <a:endParaRPr lang="pt-BR" sz="2400" dirty="0" smtClean="0"/>
-          </a:p>
-          <a:p>
-            <a:r>
-              <a:rPr lang="pt-BR" sz="2400" dirty="0" smtClean="0"/>
+            <a:endParaRPr lang="pt-BR" sz="2400" dirty="0"/>
+          </a:p>
+          <a:p>
+            <a:endParaRPr lang="pt-BR" sz="2400" dirty="0"/>
+          </a:p>
+          <a:p>
+            <a:r>
+              <a:rPr lang="pt-BR" sz="2400" dirty="0"/>
               <a:t>Por isso há um pequeno </a:t>
             </a:r>
             <a:r>
-              <a:rPr lang="pt-BR" sz="2400" dirty="0" err="1" smtClean="0"/>
+              <a:rPr lang="pt-BR" sz="2400" dirty="0" err="1"/>
               <a:t>delay</a:t>
             </a:r>
             <a:r>
-              <a:rPr lang="pt-BR" sz="2400" dirty="0" smtClean="0"/>
+              <a:rPr lang="pt-BR" sz="2400" dirty="0"/>
               <a:t> pra carregar o </a:t>
             </a:r>
             <a:r>
-              <a:rPr lang="pt-BR" sz="2400" dirty="0" err="1" smtClean="0"/>
+              <a:rPr lang="pt-BR" sz="2400" dirty="0" err="1"/>
               <a:t>css</a:t>
             </a:r>
             <a:r>
-              <a:rPr lang="pt-BR" sz="2400" dirty="0" smtClean="0"/>
+              <a:rPr lang="pt-BR" sz="2400" dirty="0"/>
               <a:t> da aplicação</a:t>
             </a:r>
           </a:p>
           <a:p>
-            <a:endParaRPr lang="pt-BR" sz="2400" dirty="0" smtClean="0"/>
+            <a:endParaRPr lang="pt-BR" sz="2400" dirty="0"/>
           </a:p>
           <a:p>
             <a:r>
@@ -5210,11 +5593,7 @@
             </a:r>
             <a:r>
               <a:rPr lang="pt-BR" sz="2400" dirty="0"/>
-              <a:t>. É quando há um hiato entre o carregamento do CSS e sua aplicação na página, permitindo que o usuário veja a página sem estar estilizada durante um breve tempo</a:t>
-            </a:r>
-            <a:r>
-              <a:rPr lang="pt-BR" sz="2400" dirty="0" smtClean="0"/>
-              <a:t>.</a:t>
+              <a:t>. É quando há um hiato entre o carregamento do CSS e sua aplicação na página, permitindo que o usuário veja a página sem estar estilizada durante um breve tempo.</a:t>
             </a:r>
           </a:p>
           <a:p>
@@ -5298,10 +5677,9 @@
           <a:lstStyle/>
           <a:p>
             <a:r>
-              <a:rPr lang="pt-BR" sz="4000" dirty="0" smtClean="0"/>
+              <a:rPr lang="pt-BR" sz="4000" dirty="0"/>
               <a:t>Revisão</a:t>
             </a:r>
-            <a:endParaRPr lang="pt-BR" sz="4000" dirty="0"/>
           </a:p>
         </p:txBody>
       </p:sp>
@@ -5543,10 +5921,9 @@
           <a:p>
             <a:pPr algn="ctr"/>
             <a:r>
-              <a:rPr lang="pt-BR" sz="2800" b="1" dirty="0" smtClean="0"/>
+              <a:rPr lang="pt-BR" sz="2800" b="1" dirty="0"/>
               <a:t>Manipulando módulos JS</a:t>
             </a:r>
-            <a:endParaRPr lang="pt-BR" sz="2800" b="1" dirty="0"/>
           </a:p>
         </p:txBody>
       </p:sp>
@@ -5606,7 +5983,6 @@
               <a:rPr lang="pt-BR" sz="2400" dirty="0"/>
               <a:t>. </a:t>
             </a:r>
-            <a:endParaRPr lang="pt-BR" sz="2400" dirty="0" smtClean="0"/>
           </a:p>
           <a:p>
             <a:endParaRPr lang="pt-BR" sz="2400" dirty="0"/>
@@ -5614,15 +5990,7 @@
           <a:p>
             <a:r>
               <a:rPr lang="pt-BR" sz="2400" dirty="0"/>
-              <a:t>Cuidado: Se </a:t>
-            </a:r>
-            <a:r>
-              <a:rPr lang="pt-BR" sz="2400" dirty="0" smtClean="0"/>
-              <a:t>digitar </a:t>
-            </a:r>
-            <a:r>
-              <a:rPr lang="pt-BR" sz="2400" dirty="0"/>
-              <a:t>$ no Console, o retorno será o seguinte</a:t>
+              <a:t>Cuidado: Se digitar $ no Console, o retorno será o seguinte</a:t>
             </a:r>
           </a:p>
           <a:p>
@@ -5630,22 +5998,17 @@
               <a:buNone/>
             </a:pPr>
             <a:r>
-              <a:rPr lang="pt-BR" sz="2400" dirty="0" smtClean="0"/>
+              <a:rPr lang="pt-BR" sz="2400" dirty="0"/>
               <a:t> 	&gt;$</a:t>
             </a:r>
-            <a:endParaRPr lang="pt-BR" sz="2400" dirty="0"/>
           </a:p>
           <a:p>
             <a:pPr marL="0" indent="0" algn="just">
               <a:buNone/>
             </a:pPr>
             <a:r>
-              <a:rPr lang="pt-BR" sz="2400" dirty="0" smtClean="0"/>
-              <a:t>	&gt;f </a:t>
-            </a:r>
-            <a:r>
-              <a:rPr lang="pt-BR" sz="2400" dirty="0"/>
-              <a:t>$(</a:t>
+              <a:rPr lang="pt-BR" sz="2400" dirty="0"/>
+              <a:t>	&gt;f $(</a:t>
             </a:r>
             <a:r>
               <a:rPr lang="pt-BR" sz="2400" dirty="0" err="1"/>
@@ -5677,11 +6040,7 @@
             </a:r>
             <a:r>
               <a:rPr lang="pt-BR" sz="2400" dirty="0"/>
-              <a:t> API] </a:t>
-            </a:r>
-            <a:r>
-              <a:rPr lang="pt-BR" sz="2400" dirty="0" smtClean="0"/>
-              <a:t>}</a:t>
+              <a:t> API] }</a:t>
             </a:r>
           </a:p>
           <a:p>
@@ -5689,7 +6048,7 @@
               <a:buNone/>
             </a:pPr>
             <a:r>
-              <a:rPr lang="pt-BR" sz="2400" dirty="0" smtClean="0"/>
+              <a:rPr lang="pt-BR" sz="2400" dirty="0"/>
               <a:t>	</a:t>
             </a:r>
           </a:p>
@@ -5699,31 +6058,15 @@
             </a:pPr>
             <a:r>
               <a:rPr lang="pt-BR" sz="2400" dirty="0"/>
-              <a:t>	</a:t>
-            </a:r>
-            <a:r>
-              <a:rPr lang="pt-BR" sz="2400" dirty="0" smtClean="0"/>
-              <a:t>O </a:t>
-            </a:r>
-            <a:r>
-              <a:rPr lang="pt-BR" sz="2400" dirty="0"/>
-              <a:t>Chrome possui uma assistente de linha de comando que recebe o nome de </a:t>
-            </a:r>
-            <a:r>
-              <a:rPr lang="pt-BR" sz="2400" dirty="0" smtClean="0"/>
-              <a:t>$ que NÃO é </a:t>
-            </a:r>
-            <a:r>
-              <a:rPr lang="pt-BR" sz="2400" dirty="0" err="1" smtClean="0"/>
+              <a:t>	O Chrome possui uma assistente de linha de comando que recebe o nome de $ que NÃO é </a:t>
+            </a:r>
+            <a:r>
+              <a:rPr lang="pt-BR" sz="2400" dirty="0" err="1"/>
               <a:t>jQuery</a:t>
             </a:r>
             <a:r>
-              <a:rPr lang="pt-BR" sz="2400" dirty="0" smtClean="0"/>
-              <a:t>. </a:t>
-            </a:r>
-            <a:r>
-              <a:rPr lang="pt-BR" sz="2400" dirty="0"/>
-              <a:t>Apesar de que o </a:t>
+              <a:rPr lang="pt-BR" sz="2400" dirty="0"/>
+              <a:t>. Apesar de que o </a:t>
             </a:r>
             <a:r>
               <a:rPr lang="pt-BR" sz="2400" dirty="0" err="1"/>
@@ -5806,10 +6149,9 @@
           <a:p>
             <a:pPr algn="ctr"/>
             <a:r>
-              <a:rPr lang="pt-BR" sz="2800" b="1" dirty="0" smtClean="0"/>
+              <a:rPr lang="pt-BR" sz="2800" b="1" dirty="0"/>
               <a:t>Manipulando módulos JS</a:t>
             </a:r>
-            <a:endParaRPr lang="pt-BR" sz="2800" b="1" dirty="0"/>
           </a:p>
         </p:txBody>
       </p:sp>
@@ -5850,7 +6192,7 @@
               <a:t>webpack.ProvidePlugin</a:t>
             </a:r>
             <a:r>
-              <a:rPr lang="pt-BR" sz="2400" dirty="0" smtClean="0"/>
+              <a:rPr lang="pt-BR" sz="2400" dirty="0"/>
               <a:t>.</a:t>
             </a:r>
           </a:p>
@@ -5915,7 +6257,7 @@
               <a:t>webpack</a:t>
             </a:r>
             <a:r>
-              <a:rPr lang="pt-BR" sz="2400" dirty="0" smtClean="0"/>
+              <a:rPr lang="pt-BR" sz="2400" dirty="0"/>
               <a:t>.</a:t>
             </a:r>
           </a:p>
@@ -5924,11 +6266,10 @@
               <a:rPr lang="pt-BR" sz="2400" dirty="0"/>
               <a:t>Um caso clássico é a dependência </a:t>
             </a:r>
-            <a:endParaRPr lang="pt-BR" sz="2400" dirty="0" smtClean="0"/>
-          </a:p>
-          <a:p>
-            <a:r>
-              <a:rPr lang="pt-BR" sz="2400" dirty="0" smtClean="0"/>
+          </a:p>
+          <a:p>
+            <a:r>
+              <a:rPr lang="pt-BR" sz="2400" dirty="0"/>
               <a:t>do </a:t>
             </a:r>
             <a:r>
@@ -6001,15 +6342,7 @@
             </a:r>
             <a:r>
               <a:rPr lang="pt-BR" sz="2400" dirty="0"/>
-              <a:t> por ter sido tratado como um módulo e isso não permitirá que ele seja acessível por outros </a:t>
-            </a:r>
-            <a:r>
-              <a:rPr lang="pt-BR" sz="2400" dirty="0" smtClean="0"/>
-              <a:t>scripts </a:t>
-            </a:r>
-            <a:r>
-              <a:rPr lang="pt-BR" sz="2400" dirty="0"/>
-              <a:t>que dependem dele.</a:t>
+              <a:t> por ter sido tratado como um módulo e isso não permitirá que ele seja acessível por outros scripts que dependem dele.</a:t>
             </a:r>
           </a:p>
         </p:txBody>

</xml_diff>